<commit_message>
Add doubletake different version
</commit_message>
<xml_diff>
--- a/doubletake/figure/stopgap.pptx
+++ b/doubletake/figure/stopgap.pptx
@@ -127,11 +127,11 @@
           <c:order val="0"/>
           <c:tx>
             <c:strRef>
-              <c:f>'Performance-SPEC2006'!$H$1</c:f>
+              <c:f>'Performance-SPEC2006'!$I$1</c:f>
               <c:strCache>
                 <c:ptCount val="1"/>
                 <c:pt idx="0">
-                  <c:v>Original</c:v>
+                  <c:v>OD</c:v>
                 </c:pt>
               </c:strCache>
             </c:strRef>
@@ -139,173 +139,13 @@
           <c:spPr>
             <a:solidFill>
               <a:schemeClr val="bg1">
-                <a:lumMod val="65000"/>
+                <a:lumMod val="50000"/>
               </a:schemeClr>
             </a:solidFill>
           </c:spPr>
           <c:cat>
             <c:strRef>
-              <c:f>'Performance-SPEC2006'!$G$2:$G$22</c:f>
-              <c:strCache>
-                <c:ptCount val="21"/>
-                <c:pt idx="0">
-                  <c:v>400.perlbench</c:v>
-                </c:pt>
-                <c:pt idx="1">
-                  <c:v>401.bzip2</c:v>
-                </c:pt>
-                <c:pt idx="2">
-                  <c:v>403.gcc</c:v>
-                </c:pt>
-                <c:pt idx="3">
-                  <c:v>429.mcf</c:v>
-                </c:pt>
-                <c:pt idx="4">
-                  <c:v>445.gobmk</c:v>
-                </c:pt>
-                <c:pt idx="5">
-                  <c:v>456.hmmer</c:v>
-                </c:pt>
-                <c:pt idx="6">
-                  <c:v>458.sjeng</c:v>
-                </c:pt>
-                <c:pt idx="7">
-                  <c:v>462.libquantum</c:v>
-                </c:pt>
-                <c:pt idx="8">
-                  <c:v>464.h264ref</c:v>
-                </c:pt>
-                <c:pt idx="9">
-                  <c:v>471.omnetpp</c:v>
-                </c:pt>
-                <c:pt idx="10">
-                  <c:v>473.astar</c:v>
-                </c:pt>
-                <c:pt idx="11">
-                  <c:v>483.xalancbmk</c:v>
-                </c:pt>
-                <c:pt idx="12">
-                  <c:v>433.milc</c:v>
-                </c:pt>
-                <c:pt idx="13">
-                  <c:v>444.namd</c:v>
-                </c:pt>
-                <c:pt idx="14">
-                  <c:v>447.dealII</c:v>
-                </c:pt>
-                <c:pt idx="15">
-                  <c:v>450.soplex</c:v>
-                </c:pt>
-                <c:pt idx="16">
-                  <c:v>453.povray</c:v>
-                </c:pt>
-                <c:pt idx="17">
-                  <c:v>470.lbm</c:v>
-                </c:pt>
-                <c:pt idx="18">
-                  <c:v>482.sphinx3</c:v>
-                </c:pt>
-                <c:pt idx="20">
-                  <c:v>AVERAGE</c:v>
-                </c:pt>
-              </c:strCache>
-            </c:strRef>
-          </c:cat>
-          <c:val>
-            <c:numRef>
               <c:f>'Performance-SPEC2006'!$H$2:$H$22</c:f>
-              <c:numCache>
-                <c:formatCode>General</c:formatCode>
-                <c:ptCount val="21"/>
-                <c:pt idx="0">
-                  <c:v>1.0</c:v>
-                </c:pt>
-                <c:pt idx="1">
-                  <c:v>1.0</c:v>
-                </c:pt>
-                <c:pt idx="2">
-                  <c:v>1.0</c:v>
-                </c:pt>
-                <c:pt idx="3">
-                  <c:v>1.0</c:v>
-                </c:pt>
-                <c:pt idx="4">
-                  <c:v>1.0</c:v>
-                </c:pt>
-                <c:pt idx="5">
-                  <c:v>1.0</c:v>
-                </c:pt>
-                <c:pt idx="6">
-                  <c:v>1.0</c:v>
-                </c:pt>
-                <c:pt idx="7">
-                  <c:v>1.0</c:v>
-                </c:pt>
-                <c:pt idx="8">
-                  <c:v>1.0</c:v>
-                </c:pt>
-                <c:pt idx="9">
-                  <c:v>1.0</c:v>
-                </c:pt>
-                <c:pt idx="10">
-                  <c:v>1.0</c:v>
-                </c:pt>
-                <c:pt idx="11">
-                  <c:v>1.0</c:v>
-                </c:pt>
-                <c:pt idx="12">
-                  <c:v>1.0</c:v>
-                </c:pt>
-                <c:pt idx="13">
-                  <c:v>1.0</c:v>
-                </c:pt>
-                <c:pt idx="14">
-                  <c:v>1.0</c:v>
-                </c:pt>
-                <c:pt idx="15">
-                  <c:v>1.0</c:v>
-                </c:pt>
-                <c:pt idx="16">
-                  <c:v>1.0</c:v>
-                </c:pt>
-                <c:pt idx="17">
-                  <c:v>1.0</c:v>
-                </c:pt>
-                <c:pt idx="18">
-                  <c:v>1.0</c:v>
-                </c:pt>
-                <c:pt idx="20">
-                  <c:v>1.0</c:v>
-                </c:pt>
-              </c:numCache>
-            </c:numRef>
-          </c:val>
-        </c:ser>
-        <c:ser>
-          <c:idx val="1"/>
-          <c:order val="1"/>
-          <c:tx>
-            <c:strRef>
-              <c:f>'Performance-SPEC2006'!$I$1</c:f>
-              <c:strCache>
-                <c:ptCount val="1"/>
-                <c:pt idx="0">
-                  <c:v>AddressSanitizer</c:v>
-                </c:pt>
-              </c:strCache>
-            </c:strRef>
-          </c:tx>
-          <c:spPr>
-            <a:solidFill>
-              <a:schemeClr val="tx1">
-                <a:lumMod val="65000"/>
-                <a:lumOff val="35000"/>
-              </a:schemeClr>
-            </a:solidFill>
-          </c:spPr>
-          <c:cat>
-            <c:strRef>
-              <c:f>'Performance-SPEC2006'!$G$2:$G$22</c:f>
               <c:strCache>
                 <c:ptCount val="21"/>
                 <c:pt idx="0">
@@ -378,79 +218,79 @@
                 <c:formatCode>General</c:formatCode>
                 <c:ptCount val="21"/>
                 <c:pt idx="0">
-                  <c:v>2.303333333333333</c:v>
+                  <c:v>1.351666666666667</c:v>
                 </c:pt>
                 <c:pt idx="1">
-                  <c:v>1.231372549019608</c:v>
+                  <c:v>0.962091503267974</c:v>
                 </c:pt>
                 <c:pt idx="2">
-                  <c:v>1.761047463175123</c:v>
+                  <c:v>0.970540098199673</c:v>
                 </c:pt>
                 <c:pt idx="3">
-                  <c:v>1.048458149779736</c:v>
+                  <c:v>0.947136563876652</c:v>
                 </c:pt>
                 <c:pt idx="4">
-                  <c:v>1.217623497997329</c:v>
+                  <c:v>0.997329773030708</c:v>
                 </c:pt>
                 <c:pt idx="5">
-                  <c:v>1.284153005464481</c:v>
+                  <c:v>0.994535519125683</c:v>
                 </c:pt>
                 <c:pt idx="6">
-                  <c:v>1.264339152119701</c:v>
+                  <c:v>0.997506234413965</c:v>
                 </c:pt>
                 <c:pt idx="7">
-                  <c:v>1.047729022324865</c:v>
+                  <c:v>0.996920708237105</c:v>
                 </c:pt>
                 <c:pt idx="8">
-                  <c:v>1.195933456561922</c:v>
+                  <c:v>1.036968576709797</c:v>
                 </c:pt>
                 <c:pt idx="9">
-                  <c:v>1.584045584045584</c:v>
+                  <c:v>0.97008547008547</c:v>
                 </c:pt>
                 <c:pt idx="10">
-                  <c:v>1.210386151797603</c:v>
+                  <c:v>1.007989347536618</c:v>
                 </c:pt>
                 <c:pt idx="11">
-                  <c:v>1.680154142581888</c:v>
+                  <c:v>1.052023121387283</c:v>
                 </c:pt>
                 <c:pt idx="12">
-                  <c:v>1.150561797752809</c:v>
+                  <c:v>1.03370786516854</c:v>
                 </c:pt>
                 <c:pt idx="13">
-                  <c:v>1.095163806552262</c:v>
+                  <c:v>0.992199687987519</c:v>
                 </c:pt>
                 <c:pt idx="14">
-                  <c:v>1.374558303886926</c:v>
+                  <c:v>1.11660777385159</c:v>
                 </c:pt>
                 <c:pt idx="15">
-                  <c:v>1.128358208955224</c:v>
+                  <c:v>1.001492537313433</c:v>
                 </c:pt>
                 <c:pt idx="16">
-                  <c:v>1.268221574344023</c:v>
+                  <c:v>0.994169096209913</c:v>
                 </c:pt>
                 <c:pt idx="17">
-                  <c:v>0.849869451697128</c:v>
+                  <c:v>0.989556135770235</c:v>
                 </c:pt>
                 <c:pt idx="18">
-                  <c:v>1.075595727198028</c:v>
+                  <c:v>0.997534921939195</c:v>
                 </c:pt>
                 <c:pt idx="20">
-                  <c:v>1.303731809399346</c:v>
+                  <c:v>1.021582189514633</c:v>
                 </c:pt>
               </c:numCache>
             </c:numRef>
           </c:val>
         </c:ser>
         <c:ser>
-          <c:idx val="2"/>
-          <c:order val="2"/>
+          <c:idx val="1"/>
+          <c:order val="1"/>
           <c:tx>
             <c:strRef>
               <c:f>'Performance-SPEC2006'!$J$1</c:f>
               <c:strCache>
                 <c:ptCount val="1"/>
                 <c:pt idx="0">
-                  <c:v>DOUBLETAKE</c:v>
+                  <c:v>OD+LD</c:v>
                 </c:pt>
               </c:strCache>
             </c:strRef>
@@ -458,14 +298,14 @@
           <c:spPr>
             <a:solidFill>
               <a:schemeClr val="tx1">
-                <a:lumMod val="95000"/>
-                <a:lumOff val="5000"/>
+                <a:lumMod val="75000"/>
+                <a:lumOff val="25000"/>
               </a:schemeClr>
             </a:solidFill>
           </c:spPr>
           <c:cat>
             <c:strRef>
-              <c:f>'Performance-SPEC2006'!$G$2:$G$22</c:f>
+              <c:f>'Performance-SPEC2006'!$H$2:$H$22</c:f>
               <c:strCache>
                 <c:ptCount val="21"/>
                 <c:pt idx="0">
@@ -538,22 +378,22 @@
                 <c:formatCode>General</c:formatCode>
                 <c:ptCount val="21"/>
                 <c:pt idx="0">
-                  <c:v>1.763333333333333</c:v>
+                  <c:v>1.306666666666667</c:v>
                 </c:pt>
                 <c:pt idx="1">
-                  <c:v>0.962091503267974</c:v>
+                  <c:v>0.963398692810458</c:v>
                 </c:pt>
                 <c:pt idx="2">
-                  <c:v>1.42062193126023</c:v>
+                  <c:v>0.970540098199673</c:v>
                 </c:pt>
                 <c:pt idx="3">
-                  <c:v>0.941262848751835</c:v>
+                  <c:v>0.945668135095448</c:v>
                 </c:pt>
                 <c:pt idx="4">
                   <c:v>0.997329773030708</c:v>
                 </c:pt>
                 <c:pt idx="5">
-                  <c:v>0.995628415300546</c:v>
+                  <c:v>0.994535519125683</c:v>
                 </c:pt>
                 <c:pt idx="6">
                   <c:v>0.997506234413965</c:v>
@@ -562,50 +402,364 @@
                   <c:v>0.996920708237105</c:v>
                 </c:pt>
                 <c:pt idx="8">
-                  <c:v>1.273567467652495</c:v>
+                  <c:v>1.040665434380776</c:v>
                 </c:pt>
                 <c:pt idx="9">
-                  <c:v>1.078347578347578</c:v>
+                  <c:v>0.978632478632479</c:v>
                 </c:pt>
                 <c:pt idx="10">
-                  <c:v>1.009320905459387</c:v>
+                  <c:v>1.007989347536618</c:v>
                 </c:pt>
                 <c:pt idx="11">
-                  <c:v>1.165703275529865</c:v>
+                  <c:v>1.059730250481696</c:v>
                 </c:pt>
                 <c:pt idx="12">
-                  <c:v>1.034831460674157</c:v>
+                  <c:v>1.03370786516854</c:v>
                 </c:pt>
                 <c:pt idx="13">
-                  <c:v>0.993759750390016</c:v>
+                  <c:v>0.992199687987519</c:v>
                 </c:pt>
                 <c:pt idx="14">
-                  <c:v>1.136042402826855</c:v>
+                  <c:v>1.118374558303887</c:v>
                 </c:pt>
                 <c:pt idx="15">
-                  <c:v>1.0</c:v>
+                  <c:v>1.001492537313433</c:v>
                 </c:pt>
                 <c:pt idx="16">
-                  <c:v>1.002915451895044</c:v>
+                  <c:v>0.994169096209913</c:v>
                 </c:pt>
                 <c:pt idx="17">
                   <c:v>0.989120974760661</c:v>
                 </c:pt>
                 <c:pt idx="18">
-                  <c:v>1.009038619556286</c:v>
+                  <c:v>0.997534921939195</c:v>
                 </c:pt>
                 <c:pt idx="20">
-                  <c:v>1.093018033404634</c:v>
+                  <c:v>1.020325420015496</c:v>
                 </c:pt>
               </c:numCache>
             </c:numRef>
           </c:val>
         </c:ser>
-        <c:axId val="233683160"/>
-        <c:axId val="233688632"/>
+        <c:ser>
+          <c:idx val="2"/>
+          <c:order val="2"/>
+          <c:tx>
+            <c:strRef>
+              <c:f>'Performance-SPEC2006'!$K$1</c:f>
+              <c:strCache>
+                <c:ptCount val="1"/>
+                <c:pt idx="0">
+                  <c:v>DOUBLETAKE</c:v>
+                </c:pt>
+              </c:strCache>
+            </c:strRef>
+          </c:tx>
+          <c:spPr>
+            <a:solidFill>
+              <a:srgbClr val="008000"/>
+            </a:solidFill>
+          </c:spPr>
+          <c:cat>
+            <c:strRef>
+              <c:f>'Performance-SPEC2006'!$H$2:$H$22</c:f>
+              <c:strCache>
+                <c:ptCount val="21"/>
+                <c:pt idx="0">
+                  <c:v>400.perlbench</c:v>
+                </c:pt>
+                <c:pt idx="1">
+                  <c:v>401.bzip2</c:v>
+                </c:pt>
+                <c:pt idx="2">
+                  <c:v>403.gcc</c:v>
+                </c:pt>
+                <c:pt idx="3">
+                  <c:v>429.mcf</c:v>
+                </c:pt>
+                <c:pt idx="4">
+                  <c:v>445.gobmk</c:v>
+                </c:pt>
+                <c:pt idx="5">
+                  <c:v>456.hmmer</c:v>
+                </c:pt>
+                <c:pt idx="6">
+                  <c:v>458.sjeng</c:v>
+                </c:pt>
+                <c:pt idx="7">
+                  <c:v>462.libquantum</c:v>
+                </c:pt>
+                <c:pt idx="8">
+                  <c:v>464.h264ref</c:v>
+                </c:pt>
+                <c:pt idx="9">
+                  <c:v>471.omnetpp</c:v>
+                </c:pt>
+                <c:pt idx="10">
+                  <c:v>473.astar</c:v>
+                </c:pt>
+                <c:pt idx="11">
+                  <c:v>483.xalancbmk</c:v>
+                </c:pt>
+                <c:pt idx="12">
+                  <c:v>433.milc</c:v>
+                </c:pt>
+                <c:pt idx="13">
+                  <c:v>444.namd</c:v>
+                </c:pt>
+                <c:pt idx="14">
+                  <c:v>447.dealII</c:v>
+                </c:pt>
+                <c:pt idx="15">
+                  <c:v>450.soplex</c:v>
+                </c:pt>
+                <c:pt idx="16">
+                  <c:v>453.povray</c:v>
+                </c:pt>
+                <c:pt idx="17">
+                  <c:v>470.lbm</c:v>
+                </c:pt>
+                <c:pt idx="18">
+                  <c:v>482.sphinx3</c:v>
+                </c:pt>
+                <c:pt idx="20">
+                  <c:v>AVERAGE</c:v>
+                </c:pt>
+              </c:strCache>
+            </c:strRef>
+          </c:cat>
+          <c:val>
+            <c:numRef>
+              <c:f>'Performance-SPEC2006'!$K$2:$K$22</c:f>
+              <c:numCache>
+                <c:formatCode>General</c:formatCode>
+                <c:ptCount val="21"/>
+                <c:pt idx="0">
+                  <c:v>1.763333333333333</c:v>
+                </c:pt>
+                <c:pt idx="1">
+                  <c:v>0.962091503267974</c:v>
+                </c:pt>
+                <c:pt idx="2">
+                  <c:v>1.42062193126023</c:v>
+                </c:pt>
+                <c:pt idx="3">
+                  <c:v>0.941262848751835</c:v>
+                </c:pt>
+                <c:pt idx="4">
+                  <c:v>0.997329773030708</c:v>
+                </c:pt>
+                <c:pt idx="5">
+                  <c:v>0.995628415300546</c:v>
+                </c:pt>
+                <c:pt idx="6">
+                  <c:v>0.997506234413965</c:v>
+                </c:pt>
+                <c:pt idx="7">
+                  <c:v>0.996920708237105</c:v>
+                </c:pt>
+                <c:pt idx="8">
+                  <c:v>1.273567467652495</c:v>
+                </c:pt>
+                <c:pt idx="9">
+                  <c:v>1.078347578347578</c:v>
+                </c:pt>
+                <c:pt idx="10">
+                  <c:v>1.009320905459387</c:v>
+                </c:pt>
+                <c:pt idx="11">
+                  <c:v>1.165703275529865</c:v>
+                </c:pt>
+                <c:pt idx="12">
+                  <c:v>1.034831460674157</c:v>
+                </c:pt>
+                <c:pt idx="13">
+                  <c:v>0.993759750390016</c:v>
+                </c:pt>
+                <c:pt idx="14">
+                  <c:v>1.136042402826855</c:v>
+                </c:pt>
+                <c:pt idx="15">
+                  <c:v>1.0</c:v>
+                </c:pt>
+                <c:pt idx="16">
+                  <c:v>1.002915451895044</c:v>
+                </c:pt>
+                <c:pt idx="17">
+                  <c:v>0.989120974760661</c:v>
+                </c:pt>
+                <c:pt idx="18">
+                  <c:v>1.009038619556286</c:v>
+                </c:pt>
+                <c:pt idx="20">
+                  <c:v>1.093018033404634</c:v>
+                </c:pt>
+              </c:numCache>
+            </c:numRef>
+          </c:val>
+        </c:ser>
+        <c:ser>
+          <c:idx val="3"/>
+          <c:order val="3"/>
+          <c:tx>
+            <c:strRef>
+              <c:f>'Performance-SPEC2006'!$L$1</c:f>
+              <c:strCache>
+                <c:ptCount val="1"/>
+                <c:pt idx="0">
+                  <c:v>AddressSanitizer</c:v>
+                </c:pt>
+              </c:strCache>
+            </c:strRef>
+          </c:tx>
+          <c:spPr>
+            <a:solidFill>
+              <a:srgbClr val="FF0000"/>
+            </a:solidFill>
+          </c:spPr>
+          <c:cat>
+            <c:strRef>
+              <c:f>'Performance-SPEC2006'!$H$2:$H$22</c:f>
+              <c:strCache>
+                <c:ptCount val="21"/>
+                <c:pt idx="0">
+                  <c:v>400.perlbench</c:v>
+                </c:pt>
+                <c:pt idx="1">
+                  <c:v>401.bzip2</c:v>
+                </c:pt>
+                <c:pt idx="2">
+                  <c:v>403.gcc</c:v>
+                </c:pt>
+                <c:pt idx="3">
+                  <c:v>429.mcf</c:v>
+                </c:pt>
+                <c:pt idx="4">
+                  <c:v>445.gobmk</c:v>
+                </c:pt>
+                <c:pt idx="5">
+                  <c:v>456.hmmer</c:v>
+                </c:pt>
+                <c:pt idx="6">
+                  <c:v>458.sjeng</c:v>
+                </c:pt>
+                <c:pt idx="7">
+                  <c:v>462.libquantum</c:v>
+                </c:pt>
+                <c:pt idx="8">
+                  <c:v>464.h264ref</c:v>
+                </c:pt>
+                <c:pt idx="9">
+                  <c:v>471.omnetpp</c:v>
+                </c:pt>
+                <c:pt idx="10">
+                  <c:v>473.astar</c:v>
+                </c:pt>
+                <c:pt idx="11">
+                  <c:v>483.xalancbmk</c:v>
+                </c:pt>
+                <c:pt idx="12">
+                  <c:v>433.milc</c:v>
+                </c:pt>
+                <c:pt idx="13">
+                  <c:v>444.namd</c:v>
+                </c:pt>
+                <c:pt idx="14">
+                  <c:v>447.dealII</c:v>
+                </c:pt>
+                <c:pt idx="15">
+                  <c:v>450.soplex</c:v>
+                </c:pt>
+                <c:pt idx="16">
+                  <c:v>453.povray</c:v>
+                </c:pt>
+                <c:pt idx="17">
+                  <c:v>470.lbm</c:v>
+                </c:pt>
+                <c:pt idx="18">
+                  <c:v>482.sphinx3</c:v>
+                </c:pt>
+                <c:pt idx="20">
+                  <c:v>AVERAGE</c:v>
+                </c:pt>
+              </c:strCache>
+            </c:strRef>
+          </c:cat>
+          <c:val>
+            <c:numRef>
+              <c:f>'Performance-SPEC2006'!$L$2:$L$22</c:f>
+              <c:numCache>
+                <c:formatCode>General</c:formatCode>
+                <c:ptCount val="21"/>
+                <c:pt idx="0">
+                  <c:v>2.303333333333333</c:v>
+                </c:pt>
+                <c:pt idx="1">
+                  <c:v>1.231372549019608</c:v>
+                </c:pt>
+                <c:pt idx="2">
+                  <c:v>1.761047463175123</c:v>
+                </c:pt>
+                <c:pt idx="3">
+                  <c:v>1.048458149779736</c:v>
+                </c:pt>
+                <c:pt idx="4">
+                  <c:v>1.217623497997329</c:v>
+                </c:pt>
+                <c:pt idx="5">
+                  <c:v>1.284153005464481</c:v>
+                </c:pt>
+                <c:pt idx="6">
+                  <c:v>1.264339152119701</c:v>
+                </c:pt>
+                <c:pt idx="7">
+                  <c:v>1.047729022324865</c:v>
+                </c:pt>
+                <c:pt idx="8">
+                  <c:v>1.195933456561922</c:v>
+                </c:pt>
+                <c:pt idx="9">
+                  <c:v>1.584045584045584</c:v>
+                </c:pt>
+                <c:pt idx="10">
+                  <c:v>1.210386151797603</c:v>
+                </c:pt>
+                <c:pt idx="11">
+                  <c:v>1.680154142581888</c:v>
+                </c:pt>
+                <c:pt idx="12">
+                  <c:v>1.150561797752809</c:v>
+                </c:pt>
+                <c:pt idx="13">
+                  <c:v>1.095163806552262</c:v>
+                </c:pt>
+                <c:pt idx="14">
+                  <c:v>1.374558303886926</c:v>
+                </c:pt>
+                <c:pt idx="15">
+                  <c:v>1.128358208955224</c:v>
+                </c:pt>
+                <c:pt idx="16">
+                  <c:v>1.268221574344023</c:v>
+                </c:pt>
+                <c:pt idx="17">
+                  <c:v>0.849869451697128</c:v>
+                </c:pt>
+                <c:pt idx="18">
+                  <c:v>1.075595727198028</c:v>
+                </c:pt>
+                <c:pt idx="20">
+                  <c:v>1.303731809399346</c:v>
+                </c:pt>
+              </c:numCache>
+            </c:numRef>
+          </c:val>
+        </c:ser>
+        <c:axId val="536412568"/>
+        <c:axId val="534753784"/>
       </c:barChart>
       <c:catAx>
-        <c:axId val="233683160"/>
+        <c:axId val="536412568"/>
         <c:scaling>
           <c:orientation val="minMax"/>
         </c:scaling>
@@ -616,19 +770,19 @@
           <a:lstStyle/>
           <a:p>
             <a:pPr>
-              <a:defRPr sz="1200" b="1"/>
+              <a:defRPr sz="1200"/>
             </a:pPr>
             <a:endParaRPr lang="en-US"/>
           </a:p>
         </c:txPr>
-        <c:crossAx val="233688632"/>
+        <c:crossAx val="534753784"/>
         <c:crosses val="autoZero"/>
         <c:auto val="1"/>
         <c:lblAlgn val="ctr"/>
         <c:lblOffset val="100"/>
       </c:catAx>
       <c:valAx>
-        <c:axId val="233688632"/>
+        <c:axId val="534753784"/>
         <c:scaling>
           <c:orientation val="minMax"/>
           <c:max val="2.0"/>
@@ -655,19 +809,37 @@
         </c:title>
         <c:numFmt formatCode="General" sourceLinked="1"/>
         <c:tickLblPos val="nextTo"/>
-        <c:crossAx val="233683160"/>
+        <c:crossAx val="536412568"/>
         <c:crosses val="autoZero"/>
         <c:crossBetween val="between"/>
       </c:valAx>
     </c:plotArea>
     <c:legend>
       <c:legendPos val="r"/>
-      <c:layout/>
+      <c:layout>
+        <c:manualLayout>
+          <c:xMode val="edge"/>
+          <c:yMode val="edge"/>
+          <c:x val="0.787077941344288"/>
+          <c:y val="0.0987984835228929"/>
+          <c:w val="0.195530754307885"/>
+          <c:h val="0.469069699620881"/>
+        </c:manualLayout>
+      </c:layout>
+      <c:txPr>
+        <a:bodyPr/>
+        <a:lstStyle/>
+        <a:p>
+          <a:pPr>
+            <a:defRPr sz="1600" b="1"/>
+          </a:pPr>
+          <a:endParaRPr lang="en-US"/>
+        </a:p>
+      </c:txPr>
     </c:legend>
     <c:plotVisOnly val="1"/>
   </c:chart>
   <c:externalData r:id="rId1"/>
-  <c:userShapes r:id="rId2"/>
 </c:chartSpace>
 </file>
 
@@ -698,8 +870,9 @@
           </c:tx>
           <c:spPr>
             <a:solidFill>
-              <a:schemeClr val="bg1">
-                <a:lumMod val="65000"/>
+              <a:schemeClr val="tx1">
+                <a:lumMod val="75000"/>
+                <a:lumOff val="25000"/>
               </a:schemeClr>
             </a:solidFill>
           </c:spPr>
@@ -832,6 +1005,9 @@
                   <c:v>1.0</c:v>
                 </c:pt>
                 <c:pt idx="18">
+                  <c:v>1.0</c:v>
+                </c:pt>
+                <c:pt idx="20">
                   <c:v>1.0</c:v>
                 </c:pt>
               </c:numCache>
@@ -847,17 +1023,14 @@
               <c:strCache>
                 <c:ptCount val="1"/>
                 <c:pt idx="0">
-                  <c:v>AddressSanitizer</c:v>
+                  <c:v>DOUBLETAKE</c:v>
                 </c:pt>
               </c:strCache>
             </c:strRef>
           </c:tx>
           <c:spPr>
             <a:solidFill>
-              <a:schemeClr val="tx1">
-                <a:lumMod val="65000"/>
-                <a:lumOff val="35000"/>
-              </a:schemeClr>
+              <a:srgbClr val="008000"/>
             </a:solidFill>
           </c:spPr>
           <c:cat>
@@ -935,64 +1108,64 @@
                 <c:formatCode>General</c:formatCode>
                 <c:ptCount val="21"/>
                 <c:pt idx="0">
-                  <c:v>2.257495144506203</c:v>
+                  <c:v>3.013863692492507</c:v>
                 </c:pt>
                 <c:pt idx="1">
-                  <c:v>1.173448936060117</c:v>
+                  <c:v>1.153766191951888</c:v>
                 </c:pt>
                 <c:pt idx="2">
-                  <c:v>3.354611859317659</c:v>
+                  <c:v>2.315939725963255</c:v>
                 </c:pt>
                 <c:pt idx="3">
-                  <c:v>1.136533414121876</c:v>
+                  <c:v>1.162044144335723</c:v>
                 </c:pt>
                 <c:pt idx="4">
-                  <c:v>4.858191054042614</c:v>
+                  <c:v>2.031007478481727</c:v>
                 </c:pt>
                 <c:pt idx="5">
-                  <c:v>10.70240828081306</c:v>
+                  <c:v>5.390625652155766</c:v>
                 </c:pt>
                 <c:pt idx="6">
-                  <c:v>1.228009698974233</c:v>
+                  <c:v>1.13737792477708</c:v>
                 </c:pt>
                 <c:pt idx="7">
-                  <c:v>2.191622591038969</c:v>
+                  <c:v>1.989026688552495</c:v>
                 </c:pt>
                 <c:pt idx="8">
-                  <c:v>2.751762894534257</c:v>
+                  <c:v>3.804387990762124</c:v>
                 </c:pt>
                 <c:pt idx="9">
-                  <c:v>3.123188363737673</c:v>
+                  <c:v>1.690549019380227</c:v>
                 </c:pt>
                 <c:pt idx="10">
-                  <c:v>2.772459837638641</c:v>
+                  <c:v>1.432690315081947</c:v>
                 </c:pt>
                 <c:pt idx="11">
-                  <c:v>2.681515516581216</c:v>
+                  <c:v>1.869561258510072</c:v>
                 </c:pt>
                 <c:pt idx="12">
-                  <c:v>1.450165021247834</c:v>
+                  <c:v>1.319383345437288</c:v>
                 </c:pt>
                 <c:pt idx="13">
-                  <c:v>1.704451267956454</c:v>
+                  <c:v>1.978785080844302</c:v>
                 </c:pt>
                 <c:pt idx="14">
-                  <c:v>4.855087402659032</c:v>
+                  <c:v>3.3597337077865</c:v>
                 </c:pt>
                 <c:pt idx="15">
-                  <c:v>4.51275134925618</c:v>
+                  <c:v>3.75123592092826</c:v>
                 </c:pt>
                 <c:pt idx="16">
-                  <c:v>34.24271099744246</c:v>
+                  <c:v>12.79462915601023</c:v>
                 </c:pt>
                 <c:pt idx="17">
-                  <c:v>1.185537008565781</c:v>
+                  <c:v>1.124070130539826</c:v>
                 </c:pt>
                 <c:pt idx="18">
-                  <c:v>4.001940634234552</c:v>
+                  <c:v>2.170378864728973</c:v>
                 </c:pt>
                 <c:pt idx="20">
-                  <c:v>4.746520593301515</c:v>
+                  <c:v>2.81521348888001</c:v>
                 </c:pt>
               </c:numCache>
             </c:numRef>
@@ -1007,17 +1180,14 @@
               <c:strCache>
                 <c:ptCount val="1"/>
                 <c:pt idx="0">
-                  <c:v>DOUBLETAKE</c:v>
+                  <c:v>AddressSanitizer</c:v>
                 </c:pt>
               </c:strCache>
             </c:strRef>
           </c:tx>
           <c:spPr>
             <a:solidFill>
-              <a:schemeClr val="tx1">
-                <a:lumMod val="95000"/>
-                <a:lumOff val="5000"/>
-              </a:schemeClr>
+              <a:srgbClr val="FF0000"/>
             </a:solidFill>
           </c:spPr>
           <c:cat>
@@ -1095,74 +1265,74 @@
                 <c:formatCode>General</c:formatCode>
                 <c:ptCount val="21"/>
                 <c:pt idx="0">
-                  <c:v>3.013863692492507</c:v>
+                  <c:v>2.257495144506203</c:v>
                 </c:pt>
                 <c:pt idx="1">
-                  <c:v>1.153766191951888</c:v>
+                  <c:v>1.173448936060117</c:v>
                 </c:pt>
                 <c:pt idx="2">
-                  <c:v>2.315939725963255</c:v>
+                  <c:v>3.354611859317659</c:v>
                 </c:pt>
                 <c:pt idx="3">
-                  <c:v>1.162044144335723</c:v>
+                  <c:v>1.136533414121876</c:v>
                 </c:pt>
                 <c:pt idx="4">
-                  <c:v>2.031007478481727</c:v>
+                  <c:v>4.858191054042614</c:v>
                 </c:pt>
                 <c:pt idx="5">
-                  <c:v>5.390625652155766</c:v>
+                  <c:v>10.70240828081306</c:v>
                 </c:pt>
                 <c:pt idx="6">
-                  <c:v>1.13737792477708</c:v>
+                  <c:v>1.228009698974233</c:v>
                 </c:pt>
                 <c:pt idx="7">
-                  <c:v>1.989026688552495</c:v>
+                  <c:v>2.191622591038969</c:v>
                 </c:pt>
                 <c:pt idx="8">
-                  <c:v>5.358568129330254</c:v>
+                  <c:v>2.751762894534257</c:v>
                 </c:pt>
                 <c:pt idx="9">
-                  <c:v>1.690549019380227</c:v>
+                  <c:v>3.123188363737673</c:v>
                 </c:pt>
                 <c:pt idx="10">
-                  <c:v>1.432690315081947</c:v>
+                  <c:v>2.772459837638641</c:v>
                 </c:pt>
                 <c:pt idx="11">
-                  <c:v>1.869561258510072</c:v>
+                  <c:v>2.681515516581216</c:v>
                 </c:pt>
                 <c:pt idx="12">
-                  <c:v>1.319383345437288</c:v>
+                  <c:v>1.450165021247834</c:v>
                 </c:pt>
                 <c:pt idx="13">
-                  <c:v>1.978785080844302</c:v>
+                  <c:v>1.704451267956454</c:v>
                 </c:pt>
                 <c:pt idx="14">
-                  <c:v>3.3597337077865</c:v>
+                  <c:v>4.855087402659032</c:v>
                 </c:pt>
                 <c:pt idx="15">
-                  <c:v>3.75123592092826</c:v>
+                  <c:v>4.51275134925618</c:v>
                 </c:pt>
                 <c:pt idx="16">
-                  <c:v>12.79462915601023</c:v>
+                  <c:v>34.24271099744246</c:v>
                 </c:pt>
                 <c:pt idx="17">
-                  <c:v>1.124070130539826</c:v>
+                  <c:v>1.185537008565781</c:v>
                 </c:pt>
                 <c:pt idx="18">
-                  <c:v>2.170378864728973</c:v>
+                  <c:v>4.001940634234552</c:v>
                 </c:pt>
                 <c:pt idx="20">
-                  <c:v>2.89701244354149</c:v>
+                  <c:v>4.746520593301515</c:v>
                 </c:pt>
               </c:numCache>
             </c:numRef>
           </c:val>
         </c:ser>
-        <c:axId val="233733032"/>
-        <c:axId val="233765208"/>
+        <c:axId val="536031992"/>
+        <c:axId val="536017272"/>
       </c:barChart>
       <c:catAx>
-        <c:axId val="233733032"/>
+        <c:axId val="536031992"/>
         <c:scaling>
           <c:orientation val="minMax"/>
         </c:scaling>
@@ -1173,19 +1343,19 @@
           <a:lstStyle/>
           <a:p>
             <a:pPr>
-              <a:defRPr sz="1200" b="1"/>
+              <a:defRPr sz="1200" b="0"/>
             </a:pPr>
             <a:endParaRPr lang="en-US"/>
           </a:p>
         </c:txPr>
-        <c:crossAx val="233765208"/>
+        <c:crossAx val="536017272"/>
         <c:crossesAt val="0.0"/>
         <c:auto val="1"/>
         <c:lblAlgn val="ctr"/>
         <c:lblOffset val="100"/>
       </c:catAx>
       <c:valAx>
-        <c:axId val="233765208"/>
+        <c:axId val="536017272"/>
         <c:scaling>
           <c:orientation val="minMax"/>
           <c:max val="15.0"/>
@@ -1200,11 +1370,20 @@
               <a:lstStyle/>
               <a:p>
                 <a:pPr>
-                  <a:defRPr sz="1600"/>
+                  <a:defRPr sz="1400"/>
                 </a:pPr>
                 <a:r>
-                  <a:rPr lang="en-US" sz="1600"/>
-                  <a:t>Normalized Runtime</a:t>
+                  <a:rPr lang="en-US" sz="1400"/>
+                  <a:t>Normalized </a:t>
+                </a:r>
+              </a:p>
+              <a:p>
+                <a:pPr>
+                  <a:defRPr sz="1400"/>
+                </a:pPr>
+                <a:r>
+                  <a:rPr lang="en-US" sz="1400"/>
+                  <a:t>Memory Usage</a:t>
                 </a:r>
               </a:p>
             </c:rich>
@@ -1213,7 +1392,7 @@
         </c:title>
         <c:numFmt formatCode="General" sourceLinked="1"/>
         <c:tickLblPos val="nextTo"/>
-        <c:crossAx val="233733032"/>
+        <c:crossAx val="536031992"/>
         <c:crosses val="autoZero"/>
         <c:crossBetween val="between"/>
         <c:majorUnit val="5.0"/>
@@ -1222,7 +1401,16 @@
     </c:plotArea>
     <c:legend>
       <c:legendPos val="r"/>
-      <c:layout/>
+      <c:layout>
+        <c:manualLayout>
+          <c:xMode val="edge"/>
+          <c:yMode val="edge"/>
+          <c:x val="0.806700673285404"/>
+          <c:y val="0.151058982210557"/>
+          <c:w val="0.173009471642132"/>
+          <c:h val="0.318252405949256"/>
+        </c:manualLayout>
+      </c:layout>
       <c:txPr>
         <a:bodyPr/>
         <a:lstStyle/>
@@ -1576,11 +1764,11 @@
             </c:numRef>
           </c:val>
         </c:ser>
-        <c:axId val="241605112"/>
-        <c:axId val="241628360"/>
+        <c:axId val="535964584"/>
+        <c:axId val="535967848"/>
       </c:barChart>
       <c:catAx>
-        <c:axId val="241605112"/>
+        <c:axId val="535964584"/>
         <c:scaling>
           <c:orientation val="minMax"/>
         </c:scaling>
@@ -1596,14 +1784,14 @@
             <a:endParaRPr lang="en-US"/>
           </a:p>
         </c:txPr>
-        <c:crossAx val="241628360"/>
+        <c:crossAx val="535967848"/>
         <c:crosses val="autoZero"/>
         <c:auto val="1"/>
         <c:lblAlgn val="ctr"/>
         <c:lblOffset val="100"/>
       </c:catAx>
       <c:valAx>
-        <c:axId val="241628360"/>
+        <c:axId val="535967848"/>
         <c:scaling>
           <c:orientation val="minMax"/>
           <c:max val="2.0"/>
@@ -1630,7 +1818,7 @@
         </c:title>
         <c:numFmt formatCode="General" sourceLinked="1"/>
         <c:tickLblPos val="nextTo"/>
-        <c:crossAx val="241605112"/>
+        <c:crossAx val="535964584"/>
         <c:crosses val="autoZero"/>
         <c:crossBetween val="between"/>
       </c:valAx>
@@ -1668,12 +1856,12 @@
 <c:userShapes xmlns:c="http://schemas.openxmlformats.org/drawingml/2006/chart">
   <cdr:relSizeAnchor xmlns:cdr="http://schemas.openxmlformats.org/drawingml/2006/chartDrawing">
     <cdr:from>
-      <cdr:x>0.096</cdr:x>
-      <cdr:y>0.02471</cdr:y>
+      <cdr:x>0.65635</cdr:x>
+      <cdr:y>0.04</cdr:y>
     </cdr:from>
     <cdr:to>
-      <cdr:x>0.15784</cdr:x>
-      <cdr:y>0.14371</cdr:y>
+      <cdr:x>0.68823</cdr:x>
+      <cdr:y>0.12642</cdr:y>
     </cdr:to>
     <cdr:sp macro="" textlink="">
       <cdr:nvSpPr>
@@ -1682,8 +1870,8 @@
       </cdr:nvSpPr>
       <cdr:spPr>
         <a:xfrm xmlns:a="http://schemas.openxmlformats.org/drawingml/2006/main">
-          <a:off x="841248" y="91440"/>
-          <a:ext cx="541867" cy="440266"/>
+          <a:off x="5751576" y="109728"/>
+          <a:ext cx="279400" cy="237066"/>
         </a:xfrm>
         <a:prstGeom xmlns:a="http://schemas.openxmlformats.org/drawingml/2006/main" prst="rect">
           <a:avLst/>
@@ -1694,51 +1882,10 @@
         <a:lstStyle xmlns:a="http://schemas.openxmlformats.org/drawingml/2006/main"/>
         <a:p xmlns:a="http://schemas.openxmlformats.org/drawingml/2006/main">
           <a:r>
-            <a:rPr lang="en-US" sz="1600" b="1" dirty="0" smtClean="0"/>
-            <a:t>2.3</a:t>
+            <a:rPr lang="en-US" dirty="0" smtClean="0"/>
+            <a:t>34</a:t>
           </a:r>
-          <a:endParaRPr lang="en-US" sz="1600" b="1" dirty="0"/>
-        </a:p>
-      </cdr:txBody>
-    </cdr:sp>
-  </cdr:relSizeAnchor>
-</c:userShapes>
-</file>
-
-<file path=ppt/drawings/drawing2.xml><?xml version="1.0" encoding="utf-8"?>
-<c:userShapes xmlns:c="http://schemas.openxmlformats.org/drawingml/2006/chart">
-  <cdr:relSizeAnchor xmlns:cdr="http://schemas.openxmlformats.org/drawingml/2006/chartDrawing">
-    <cdr:from>
-      <cdr:x>0.59478</cdr:x>
-      <cdr:y>0.06667</cdr:y>
-    </cdr:from>
-    <cdr:to>
-      <cdr:x>0.66048</cdr:x>
-      <cdr:y>0.20247</cdr:y>
-    </cdr:to>
-    <cdr:sp macro="" textlink="">
-      <cdr:nvSpPr>
-        <cdr:cNvPr id="2" name="TextBox 1"/>
-        <cdr:cNvSpPr txBox="1"/>
-      </cdr:nvSpPr>
-      <cdr:spPr>
-        <a:xfrm xmlns:a="http://schemas.openxmlformats.org/drawingml/2006/main">
-          <a:off x="5212080" y="182880"/>
-          <a:ext cx="575734" cy="372533"/>
-        </a:xfrm>
-        <a:prstGeom xmlns:a="http://schemas.openxmlformats.org/drawingml/2006/main" prst="rect">
-          <a:avLst/>
-        </a:prstGeom>
-      </cdr:spPr>
-      <cdr:txBody>
-        <a:bodyPr xmlns:a="http://schemas.openxmlformats.org/drawingml/2006/main" wrap="none" rtlCol="0"/>
-        <a:lstStyle xmlns:a="http://schemas.openxmlformats.org/drawingml/2006/main"/>
-        <a:p xmlns:a="http://schemas.openxmlformats.org/drawingml/2006/main">
-          <a:r>
-            <a:rPr lang="en-US" sz="1600" b="1" dirty="0" smtClean="0"/>
-            <a:t>34X</a:t>
-          </a:r>
-          <a:endParaRPr lang="en-US" sz="1600" b="1" dirty="0"/>
+          <a:endParaRPr lang="en-US" sz="1100" dirty="0"/>
         </a:p>
       </cdr:txBody>
     </cdr:sp>
@@ -1928,7 +2075,7 @@
             <a:fld id="{82C54E34-418F-FF4D-B9B4-908E607D3FF1}" type="datetimeFigureOut">
               <a:rPr lang="en-US" smtClean="0"/>
               <a:pPr/>
-              <a:t>11/12/13</a:t>
+              <a:t>12/17/13</a:t>
             </a:fld>
             <a:endParaRPr lang="en-US"/>
           </a:p>
@@ -2095,7 +2242,7 @@
             <a:fld id="{82C54E34-418F-FF4D-B9B4-908E607D3FF1}" type="datetimeFigureOut">
               <a:rPr lang="en-US" smtClean="0"/>
               <a:pPr/>
-              <a:t>11/12/13</a:t>
+              <a:t>12/17/13</a:t>
             </a:fld>
             <a:endParaRPr lang="en-US"/>
           </a:p>
@@ -2272,7 +2419,7 @@
             <a:fld id="{82C54E34-418F-FF4D-B9B4-908E607D3FF1}" type="datetimeFigureOut">
               <a:rPr lang="en-US" smtClean="0"/>
               <a:pPr/>
-              <a:t>11/12/13</a:t>
+              <a:t>12/17/13</a:t>
             </a:fld>
             <a:endParaRPr lang="en-US"/>
           </a:p>
@@ -2439,7 +2586,7 @@
             <a:fld id="{82C54E34-418F-FF4D-B9B4-908E607D3FF1}" type="datetimeFigureOut">
               <a:rPr lang="en-US" smtClean="0"/>
               <a:pPr/>
-              <a:t>11/12/13</a:t>
+              <a:t>12/17/13</a:t>
             </a:fld>
             <a:endParaRPr lang="en-US"/>
           </a:p>
@@ -2682,7 +2829,7 @@
             <a:fld id="{82C54E34-418F-FF4D-B9B4-908E607D3FF1}" type="datetimeFigureOut">
               <a:rPr lang="en-US" smtClean="0"/>
               <a:pPr/>
-              <a:t>11/12/13</a:t>
+              <a:t>12/17/13</a:t>
             </a:fld>
             <a:endParaRPr lang="en-US"/>
           </a:p>
@@ -2967,7 +3114,7 @@
             <a:fld id="{82C54E34-418F-FF4D-B9B4-908E607D3FF1}" type="datetimeFigureOut">
               <a:rPr lang="en-US" smtClean="0"/>
               <a:pPr/>
-              <a:t>11/12/13</a:t>
+              <a:t>12/17/13</a:t>
             </a:fld>
             <a:endParaRPr lang="en-US"/>
           </a:p>
@@ -3386,7 +3533,7 @@
             <a:fld id="{82C54E34-418F-FF4D-B9B4-908E607D3FF1}" type="datetimeFigureOut">
               <a:rPr lang="en-US" smtClean="0"/>
               <a:pPr/>
-              <a:t>11/12/13</a:t>
+              <a:t>12/17/13</a:t>
             </a:fld>
             <a:endParaRPr lang="en-US"/>
           </a:p>
@@ -3501,7 +3648,7 @@
             <a:fld id="{82C54E34-418F-FF4D-B9B4-908E607D3FF1}" type="datetimeFigureOut">
               <a:rPr lang="en-US" smtClean="0"/>
               <a:pPr/>
-              <a:t>11/12/13</a:t>
+              <a:t>12/17/13</a:t>
             </a:fld>
             <a:endParaRPr lang="en-US"/>
           </a:p>
@@ -3593,7 +3740,7 @@
             <a:fld id="{82C54E34-418F-FF4D-B9B4-908E607D3FF1}" type="datetimeFigureOut">
               <a:rPr lang="en-US" smtClean="0"/>
               <a:pPr/>
-              <a:t>11/12/13</a:t>
+              <a:t>12/17/13</a:t>
             </a:fld>
             <a:endParaRPr lang="en-US"/>
           </a:p>
@@ -3867,7 +4014,7 @@
             <a:fld id="{82C54E34-418F-FF4D-B9B4-908E607D3FF1}" type="datetimeFigureOut">
               <a:rPr lang="en-US" smtClean="0"/>
               <a:pPr/>
-              <a:t>11/12/13</a:t>
+              <a:t>12/17/13</a:t>
             </a:fld>
             <a:endParaRPr lang="en-US"/>
           </a:p>
@@ -4117,7 +4264,7 @@
             <a:fld id="{82C54E34-418F-FF4D-B9B4-908E607D3FF1}" type="datetimeFigureOut">
               <a:rPr lang="en-US" smtClean="0"/>
               <a:pPr/>
-              <a:t>11/12/13</a:t>
+              <a:t>12/17/13</a:t>
             </a:fld>
             <a:endParaRPr lang="en-US"/>
           </a:p>
@@ -4327,7 +4474,7 @@
             <a:fld id="{82C54E34-418F-FF4D-B9B4-908E607D3FF1}" type="datetimeFigureOut">
               <a:rPr lang="en-US" smtClean="0"/>
               <a:pPr/>
-              <a:t>11/12/13</a:t>
+              <a:t>12/17/13</a:t>
             </a:fld>
             <a:endParaRPr lang="en-US"/>
           </a:p>
@@ -5123,6 +5270,13 @@
   <p:clrMapOvr>
     <a:masterClrMapping/>
   </p:clrMapOvr>
+  <p:timing>
+    <p:tnLst>
+      <p:par>
+        <p:cTn id="1" dur="indefinite" restart="never" nodeType="tmRoot"/>
+      </p:par>
+    </p:tnLst>
+  </p:timing>
 </p:sld>
 </file>
 
@@ -5143,78 +5297,820 @@
           <a:chExt cx="0" cy="0"/>
         </a:xfrm>
       </p:grpSpPr>
+      <p:cxnSp>
+        <p:nvCxnSpPr>
+          <p:cNvPr id="8" name="Straight Connector 7"/>
+          <p:cNvCxnSpPr>
+            <a:stCxn id="24" idx="3"/>
+          </p:cNvCxnSpPr>
+          <p:nvPr/>
+        </p:nvCxnSpPr>
+        <p:spPr>
+          <a:xfrm>
+            <a:off x="1956117" y="4234349"/>
+            <a:ext cx="694536" cy="1588"/>
+          </a:xfrm>
+          <a:prstGeom prst="line">
+            <a:avLst/>
+          </a:prstGeom>
+          <a:ln w="25400">
+            <a:solidFill>
+              <a:schemeClr val="tx1"/>
+            </a:solidFill>
+            <a:tailEnd type="triangle"/>
+          </a:ln>
+        </p:spPr>
+        <p:style>
+          <a:lnRef idx="2">
+            <a:schemeClr val="accent1"/>
+          </a:lnRef>
+          <a:fillRef idx="0">
+            <a:schemeClr val="accent1"/>
+          </a:fillRef>
+          <a:effectRef idx="1">
+            <a:schemeClr val="accent1"/>
+          </a:effectRef>
+          <a:fontRef idx="minor">
+            <a:schemeClr val="tx1"/>
+          </a:fontRef>
+        </p:style>
+      </p:cxnSp>
+      <p:sp>
+        <p:nvSpPr>
+          <p:cNvPr id="24" name="Rectangle 23"/>
+          <p:cNvSpPr/>
+          <p:nvPr/>
+        </p:nvSpPr>
+        <p:spPr>
+          <a:xfrm>
+            <a:off x="711200" y="4014216"/>
+            <a:ext cx="1244917" cy="440266"/>
+          </a:xfrm>
+          <a:prstGeom prst="rect">
+            <a:avLst/>
+          </a:prstGeom>
+          <a:noFill/>
+          <a:ln>
+            <a:solidFill>
+              <a:schemeClr val="tx1"/>
+            </a:solidFill>
+          </a:ln>
+          <a:effectLst/>
+        </p:spPr>
+        <p:style>
+          <a:lnRef idx="1">
+            <a:schemeClr val="accent1"/>
+          </a:lnRef>
+          <a:fillRef idx="3">
+            <a:schemeClr val="accent1"/>
+          </a:fillRef>
+          <a:effectRef idx="2">
+            <a:schemeClr val="accent1"/>
+          </a:effectRef>
+          <a:fontRef idx="minor">
+            <a:schemeClr val="lt1"/>
+          </a:fontRef>
+        </p:style>
+        <p:txBody>
+          <a:bodyPr lIns="0" tIns="18288" rIns="0" rtlCol="0" anchor="ctr"/>
+          <a:lstStyle/>
+          <a:p>
+            <a:pPr algn="ctr"/>
+            <a:r>
+              <a:rPr lang="en-US" sz="1400" dirty="0" err="1" smtClean="0">
+                <a:solidFill>
+                  <a:schemeClr val="tx1"/>
+                </a:solidFill>
+              </a:rPr>
+              <a:t>Checkpointing</a:t>
+            </a:r>
+            <a:endParaRPr lang="en-US" sz="1400" dirty="0" smtClean="0">
+              <a:solidFill>
+                <a:schemeClr val="tx1"/>
+              </a:solidFill>
+            </a:endParaRPr>
+          </a:p>
+          <a:p>
+            <a:pPr algn="ctr"/>
+            <a:r>
+              <a:rPr lang="en-US" sz="1400" dirty="0" smtClean="0">
+                <a:solidFill>
+                  <a:schemeClr val="tx1"/>
+                </a:solidFill>
+              </a:rPr>
+              <a:t>Execution</a:t>
+            </a:r>
+            <a:endParaRPr lang="en-US" sz="1400" dirty="0">
+              <a:solidFill>
+                <a:schemeClr val="tx1"/>
+              </a:solidFill>
+            </a:endParaRPr>
+          </a:p>
+        </p:txBody>
+      </p:sp>
+      <p:sp>
+        <p:nvSpPr>
+          <p:cNvPr id="26" name="Rectangle 25"/>
+          <p:cNvSpPr/>
+          <p:nvPr/>
+        </p:nvSpPr>
+        <p:spPr>
+          <a:xfrm>
+            <a:off x="5202936" y="4014216"/>
+            <a:ext cx="911983" cy="440266"/>
+          </a:xfrm>
+          <a:prstGeom prst="rect">
+            <a:avLst/>
+          </a:prstGeom>
+          <a:noFill/>
+          <a:ln>
+            <a:solidFill>
+              <a:schemeClr val="tx1"/>
+            </a:solidFill>
+          </a:ln>
+          <a:effectLst/>
+        </p:spPr>
+        <p:style>
+          <a:lnRef idx="1">
+            <a:schemeClr val="accent1"/>
+          </a:lnRef>
+          <a:fillRef idx="3">
+            <a:schemeClr val="accent1"/>
+          </a:fillRef>
+          <a:effectRef idx="2">
+            <a:schemeClr val="accent1"/>
+          </a:effectRef>
+          <a:fontRef idx="minor">
+            <a:schemeClr val="lt1"/>
+          </a:fontRef>
+        </p:style>
+        <p:txBody>
+          <a:bodyPr lIns="0" tIns="18288" rIns="0" rtlCol="0" anchor="ctr"/>
+          <a:lstStyle/>
+          <a:p>
+            <a:pPr algn="ctr"/>
+            <a:r>
+              <a:rPr lang="en-US" sz="1400" dirty="0" smtClean="0">
+                <a:solidFill>
+                  <a:schemeClr val="tx1"/>
+                </a:solidFill>
+              </a:rPr>
+              <a:t>Verifying Evidence</a:t>
+            </a:r>
+            <a:endParaRPr lang="en-US" sz="1400" dirty="0">
+              <a:solidFill>
+                <a:schemeClr val="tx1"/>
+              </a:solidFill>
+            </a:endParaRPr>
+          </a:p>
+        </p:txBody>
+      </p:sp>
+      <p:cxnSp>
+        <p:nvCxnSpPr>
+          <p:cNvPr id="28" name="Straight Connector 27"/>
+          <p:cNvCxnSpPr>
+            <a:endCxn id="26" idx="1"/>
+          </p:cNvCxnSpPr>
+          <p:nvPr/>
+        </p:nvCxnSpPr>
+        <p:spPr>
+          <a:xfrm>
+            <a:off x="3528477" y="4234349"/>
+            <a:ext cx="1674459" cy="1588"/>
+          </a:xfrm>
+          <a:prstGeom prst="line">
+            <a:avLst/>
+          </a:prstGeom>
+          <a:ln w="25400">
+            <a:solidFill>
+              <a:schemeClr val="tx1"/>
+            </a:solidFill>
+            <a:tailEnd type="triangle"/>
+          </a:ln>
+        </p:spPr>
+        <p:style>
+          <a:lnRef idx="2">
+            <a:schemeClr val="accent1"/>
+          </a:lnRef>
+          <a:fillRef idx="0">
+            <a:schemeClr val="accent1"/>
+          </a:fillRef>
+          <a:effectRef idx="1">
+            <a:schemeClr val="accent1"/>
+          </a:effectRef>
+          <a:fontRef idx="minor">
+            <a:schemeClr val="tx1"/>
+          </a:fontRef>
+        </p:style>
+      </p:cxnSp>
+      <p:sp>
+        <p:nvSpPr>
+          <p:cNvPr id="38" name="Hexagon 37"/>
+          <p:cNvSpPr/>
+          <p:nvPr/>
+        </p:nvSpPr>
+        <p:spPr>
+          <a:xfrm>
+            <a:off x="7476066" y="3959352"/>
+            <a:ext cx="1041401" cy="457200"/>
+          </a:xfrm>
+          <a:prstGeom prst="hexagon">
+            <a:avLst/>
+          </a:prstGeom>
+          <a:noFill/>
+          <a:ln>
+            <a:solidFill>
+              <a:schemeClr val="tx1"/>
+            </a:solidFill>
+          </a:ln>
+          <a:effectLst/>
+        </p:spPr>
+        <p:style>
+          <a:lnRef idx="1">
+            <a:schemeClr val="accent1"/>
+          </a:lnRef>
+          <a:fillRef idx="3">
+            <a:schemeClr val="accent1"/>
+          </a:fillRef>
+          <a:effectRef idx="2">
+            <a:schemeClr val="accent1"/>
+          </a:effectRef>
+          <a:fontRef idx="minor">
+            <a:schemeClr val="lt1"/>
+          </a:fontRef>
+        </p:style>
+        <p:txBody>
+          <a:bodyPr lIns="0" rIns="0" rtlCol="0" anchor="ctr"/>
+          <a:lstStyle/>
+          <a:p>
+            <a:pPr algn="ctr"/>
+            <a:r>
+              <a:rPr lang="en-US" sz="1400" dirty="0" smtClean="0">
+                <a:solidFill>
+                  <a:schemeClr val="tx1"/>
+                </a:solidFill>
+              </a:rPr>
+              <a:t>Memory Errors ?</a:t>
+            </a:r>
+            <a:endParaRPr lang="en-US" sz="1400" dirty="0">
+              <a:solidFill>
+                <a:schemeClr val="tx1"/>
+              </a:solidFill>
+            </a:endParaRPr>
+          </a:p>
+        </p:txBody>
+      </p:sp>
+      <p:cxnSp>
+        <p:nvCxnSpPr>
+          <p:cNvPr id="39" name="Straight Connector 38"/>
+          <p:cNvCxnSpPr>
+            <a:stCxn id="26" idx="3"/>
+          </p:cNvCxnSpPr>
+          <p:nvPr/>
+        </p:nvCxnSpPr>
+        <p:spPr>
+          <a:xfrm>
+            <a:off x="6114919" y="4234349"/>
+            <a:ext cx="1366955" cy="3482"/>
+          </a:xfrm>
+          <a:prstGeom prst="line">
+            <a:avLst/>
+          </a:prstGeom>
+          <a:ln w="25400">
+            <a:solidFill>
+              <a:schemeClr val="tx1"/>
+            </a:solidFill>
+            <a:tailEnd type="triangle"/>
+          </a:ln>
+        </p:spPr>
+        <p:style>
+          <a:lnRef idx="2">
+            <a:schemeClr val="accent1"/>
+          </a:lnRef>
+          <a:fillRef idx="0">
+            <a:schemeClr val="accent1"/>
+          </a:fillRef>
+          <a:effectRef idx="1">
+            <a:schemeClr val="accent1"/>
+          </a:effectRef>
+          <a:fontRef idx="minor">
+            <a:schemeClr val="tx1"/>
+          </a:fontRef>
+        </p:style>
+      </p:cxnSp>
+      <p:sp>
+        <p:nvSpPr>
+          <p:cNvPr id="42" name="Rectangle 41"/>
+          <p:cNvSpPr/>
+          <p:nvPr/>
+        </p:nvSpPr>
+        <p:spPr>
+          <a:xfrm>
+            <a:off x="3962400" y="3282696"/>
+            <a:ext cx="1657058" cy="440266"/>
+          </a:xfrm>
+          <a:prstGeom prst="rect">
+            <a:avLst/>
+          </a:prstGeom>
+          <a:noFill/>
+          <a:ln>
+            <a:solidFill>
+              <a:schemeClr val="tx1"/>
+            </a:solidFill>
+          </a:ln>
+          <a:effectLst/>
+        </p:spPr>
+        <p:style>
+          <a:lnRef idx="1">
+            <a:schemeClr val="accent1"/>
+          </a:lnRef>
+          <a:fillRef idx="3">
+            <a:schemeClr val="accent1"/>
+          </a:fillRef>
+          <a:effectRef idx="2">
+            <a:schemeClr val="accent1"/>
+          </a:effectRef>
+          <a:fontRef idx="minor">
+            <a:schemeClr val="lt1"/>
+          </a:fontRef>
+        </p:style>
+        <p:txBody>
+          <a:bodyPr lIns="0" tIns="18288" rIns="0" rtlCol="0" anchor="ctr"/>
+          <a:lstStyle/>
+          <a:p>
+            <a:pPr algn="ctr"/>
+            <a:r>
+              <a:rPr lang="en-US" sz="1400" dirty="0" smtClean="0">
+                <a:solidFill>
+                  <a:schemeClr val="tx1"/>
+                </a:solidFill>
+              </a:rPr>
+              <a:t>Issue </a:t>
+            </a:r>
+            <a:r>
+              <a:rPr lang="en-US" sz="1400" dirty="0" err="1" smtClean="0">
+                <a:solidFill>
+                  <a:schemeClr val="tx1"/>
+                </a:solidFill>
+              </a:rPr>
+              <a:t>syscall</a:t>
+            </a:r>
+            <a:r>
+              <a:rPr lang="en-US" sz="1400" dirty="0" smtClean="0">
+                <a:solidFill>
+                  <a:schemeClr val="tx1"/>
+                </a:solidFill>
+              </a:rPr>
+              <a:t> and </a:t>
+            </a:r>
+          </a:p>
+          <a:p>
+            <a:pPr algn="ctr"/>
+            <a:r>
+              <a:rPr lang="en-US" sz="1400" dirty="0" smtClean="0">
+                <a:solidFill>
+                  <a:schemeClr val="tx1"/>
+                </a:solidFill>
+              </a:rPr>
+              <a:t>enter next epoch</a:t>
+            </a:r>
+            <a:endParaRPr lang="en-US" sz="1400" dirty="0">
+              <a:solidFill>
+                <a:schemeClr val="tx1"/>
+              </a:solidFill>
+            </a:endParaRPr>
+          </a:p>
+        </p:txBody>
+      </p:sp>
+      <p:cxnSp>
+        <p:nvCxnSpPr>
+          <p:cNvPr id="44" name="Elbow Connector 43"/>
+          <p:cNvCxnSpPr>
+            <a:endCxn id="42" idx="3"/>
+          </p:cNvCxnSpPr>
+          <p:nvPr/>
+        </p:nvCxnSpPr>
+        <p:spPr>
+          <a:xfrm rot="10800000">
+            <a:off x="5619459" y="3502830"/>
+            <a:ext cx="2381555" cy="456527"/>
+          </a:xfrm>
+          <a:prstGeom prst="bentConnector3">
+            <a:avLst>
+              <a:gd name="adj1" fmla="val 229"/>
+            </a:avLst>
+          </a:prstGeom>
+          <a:ln>
+            <a:solidFill>
+              <a:schemeClr val="tx1"/>
+            </a:solidFill>
+            <a:tailEnd type="arrow"/>
+          </a:ln>
+        </p:spPr>
+        <p:style>
+          <a:lnRef idx="2">
+            <a:schemeClr val="accent1"/>
+          </a:lnRef>
+          <a:fillRef idx="0">
+            <a:schemeClr val="accent1"/>
+          </a:fillRef>
+          <a:effectRef idx="1">
+            <a:schemeClr val="accent1"/>
+          </a:effectRef>
+          <a:fontRef idx="minor">
+            <a:schemeClr val="tx1"/>
+          </a:fontRef>
+        </p:style>
+      </p:cxnSp>
+      <p:cxnSp>
+        <p:nvCxnSpPr>
+          <p:cNvPr id="47" name="Elbow Connector 46"/>
+          <p:cNvCxnSpPr>
+            <a:stCxn id="42" idx="1"/>
+            <a:endCxn id="24" idx="0"/>
+          </p:cNvCxnSpPr>
+          <p:nvPr/>
+        </p:nvCxnSpPr>
+        <p:spPr>
+          <a:xfrm rot="10800000" flipV="1">
+            <a:off x="1333660" y="3502828"/>
+            <a:ext cx="2628741" cy="511387"/>
+          </a:xfrm>
+          <a:prstGeom prst="bentConnector2">
+            <a:avLst/>
+          </a:prstGeom>
+          <a:ln>
+            <a:solidFill>
+              <a:schemeClr val="tx1"/>
+            </a:solidFill>
+            <a:tailEnd type="arrow"/>
+          </a:ln>
+        </p:spPr>
+        <p:style>
+          <a:lnRef idx="2">
+            <a:schemeClr val="accent1"/>
+          </a:lnRef>
+          <a:fillRef idx="0">
+            <a:schemeClr val="accent1"/>
+          </a:fillRef>
+          <a:effectRef idx="1">
+            <a:schemeClr val="accent1"/>
+          </a:effectRef>
+          <a:fontRef idx="minor">
+            <a:schemeClr val="tx1"/>
+          </a:fontRef>
+        </p:style>
+      </p:cxnSp>
+      <p:sp>
+        <p:nvSpPr>
+          <p:cNvPr id="50" name="Rectangle 49"/>
+          <p:cNvSpPr/>
+          <p:nvPr/>
+        </p:nvSpPr>
+        <p:spPr>
+          <a:xfrm>
+            <a:off x="3693884" y="4745736"/>
+            <a:ext cx="1182915" cy="440266"/>
+          </a:xfrm>
+          <a:prstGeom prst="rect">
+            <a:avLst/>
+          </a:prstGeom>
+          <a:noFill/>
+          <a:ln>
+            <a:solidFill>
+              <a:schemeClr val="tx1"/>
+            </a:solidFill>
+          </a:ln>
+          <a:effectLst/>
+        </p:spPr>
+        <p:style>
+          <a:lnRef idx="1">
+            <a:schemeClr val="accent1"/>
+          </a:lnRef>
+          <a:fillRef idx="3">
+            <a:schemeClr val="accent1"/>
+          </a:fillRef>
+          <a:effectRef idx="2">
+            <a:schemeClr val="accent1"/>
+          </a:effectRef>
+          <a:fontRef idx="minor">
+            <a:schemeClr val="lt1"/>
+          </a:fontRef>
+        </p:style>
+        <p:txBody>
+          <a:bodyPr lIns="0" tIns="18288" rIns="0" rtlCol="0" anchor="ctr"/>
+          <a:lstStyle/>
+          <a:p>
+            <a:pPr algn="ctr"/>
+            <a:r>
+              <a:rPr lang="en-US" sz="1400" dirty="0" smtClean="0">
+                <a:solidFill>
+                  <a:schemeClr val="tx1"/>
+                </a:solidFill>
+              </a:rPr>
+              <a:t>Rollback </a:t>
+            </a:r>
+          </a:p>
+          <a:p>
+            <a:pPr algn="ctr"/>
+            <a:r>
+              <a:rPr lang="en-US" sz="1400" dirty="0" smtClean="0">
+                <a:solidFill>
+                  <a:schemeClr val="tx1"/>
+                </a:solidFill>
+              </a:rPr>
+              <a:t>the Program</a:t>
+            </a:r>
+            <a:endParaRPr lang="en-US" sz="1400" dirty="0">
+              <a:solidFill>
+                <a:schemeClr val="tx1"/>
+              </a:solidFill>
+            </a:endParaRPr>
+          </a:p>
+        </p:txBody>
+      </p:sp>
+      <p:sp>
+        <p:nvSpPr>
+          <p:cNvPr id="52" name="Rectangle 51"/>
+          <p:cNvSpPr/>
+          <p:nvPr/>
+        </p:nvSpPr>
+        <p:spPr>
+          <a:xfrm>
+            <a:off x="5619458" y="4745735"/>
+            <a:ext cx="1856607" cy="440266"/>
+          </a:xfrm>
+          <a:prstGeom prst="rect">
+            <a:avLst/>
+          </a:prstGeom>
+          <a:noFill/>
+          <a:ln>
+            <a:solidFill>
+              <a:schemeClr val="tx1"/>
+            </a:solidFill>
+          </a:ln>
+          <a:effectLst/>
+        </p:spPr>
+        <p:style>
+          <a:lnRef idx="1">
+            <a:schemeClr val="accent1"/>
+          </a:lnRef>
+          <a:fillRef idx="3">
+            <a:schemeClr val="accent1"/>
+          </a:fillRef>
+          <a:effectRef idx="2">
+            <a:schemeClr val="accent1"/>
+          </a:effectRef>
+          <a:fontRef idx="minor">
+            <a:schemeClr val="lt1"/>
+          </a:fontRef>
+        </p:style>
+        <p:txBody>
+          <a:bodyPr lIns="0" tIns="18288" rIns="0" rtlCol="0" anchor="ctr"/>
+          <a:lstStyle/>
+          <a:p>
+            <a:pPr algn="ctr"/>
+            <a:r>
+              <a:rPr lang="en-US" sz="1400" dirty="0" smtClean="0">
+                <a:solidFill>
+                  <a:schemeClr val="tx1"/>
+                </a:solidFill>
+              </a:rPr>
+              <a:t>Installing </a:t>
+            </a:r>
+            <a:r>
+              <a:rPr lang="en-US" sz="1400" dirty="0" err="1" smtClean="0">
+                <a:solidFill>
+                  <a:schemeClr val="tx1"/>
+                </a:solidFill>
+              </a:rPr>
+              <a:t>Watchpoints</a:t>
+            </a:r>
+            <a:r>
+              <a:rPr lang="en-US" sz="1400" dirty="0" smtClean="0">
+                <a:solidFill>
+                  <a:schemeClr val="tx1"/>
+                </a:solidFill>
+              </a:rPr>
+              <a:t> or other Instrumentation</a:t>
+            </a:r>
+            <a:endParaRPr lang="en-US" sz="1400" dirty="0">
+              <a:solidFill>
+                <a:schemeClr val="tx1"/>
+              </a:solidFill>
+            </a:endParaRPr>
+          </a:p>
+        </p:txBody>
+      </p:sp>
+      <p:cxnSp>
+        <p:nvCxnSpPr>
+          <p:cNvPr id="60" name="Elbow Connector 59"/>
+          <p:cNvCxnSpPr>
+            <a:endCxn id="52" idx="3"/>
+          </p:cNvCxnSpPr>
+          <p:nvPr/>
+        </p:nvCxnSpPr>
+        <p:spPr>
+          <a:xfrm rot="10800000" flipV="1">
+            <a:off x="7476066" y="4454482"/>
+            <a:ext cx="524945" cy="511386"/>
+          </a:xfrm>
+          <a:prstGeom prst="bentConnector3">
+            <a:avLst>
+              <a:gd name="adj1" fmla="val -1612"/>
+            </a:avLst>
+          </a:prstGeom>
+          <a:ln>
+            <a:solidFill>
+              <a:schemeClr val="tx1"/>
+            </a:solidFill>
+            <a:tailEnd type="arrow"/>
+          </a:ln>
+        </p:spPr>
+        <p:style>
+          <a:lnRef idx="2">
+            <a:schemeClr val="accent1"/>
+          </a:lnRef>
+          <a:fillRef idx="0">
+            <a:schemeClr val="accent1"/>
+          </a:fillRef>
+          <a:effectRef idx="1">
+            <a:schemeClr val="accent1"/>
+          </a:effectRef>
+          <a:fontRef idx="minor">
+            <a:schemeClr val="tx1"/>
+          </a:fontRef>
+        </p:style>
+      </p:cxnSp>
+      <p:cxnSp>
+        <p:nvCxnSpPr>
+          <p:cNvPr id="63" name="Straight Connector 62"/>
+          <p:cNvCxnSpPr>
+            <a:stCxn id="52" idx="1"/>
+            <a:endCxn id="50" idx="3"/>
+          </p:cNvCxnSpPr>
+          <p:nvPr/>
+        </p:nvCxnSpPr>
+        <p:spPr>
+          <a:xfrm rot="10800000" flipV="1">
+            <a:off x="4876800" y="4965867"/>
+            <a:ext cx="742659" cy="1"/>
+          </a:xfrm>
+          <a:prstGeom prst="line">
+            <a:avLst/>
+          </a:prstGeom>
+          <a:ln>
+            <a:solidFill>
+              <a:schemeClr val="tx1"/>
+            </a:solidFill>
+            <a:headEnd type="none"/>
+            <a:tailEnd type="triangle"/>
+          </a:ln>
+        </p:spPr>
+        <p:style>
+          <a:lnRef idx="2">
+            <a:schemeClr val="accent1"/>
+          </a:lnRef>
+          <a:fillRef idx="0">
+            <a:schemeClr val="accent1"/>
+          </a:fillRef>
+          <a:effectRef idx="1">
+            <a:schemeClr val="accent1"/>
+          </a:effectRef>
+          <a:fontRef idx="minor">
+            <a:schemeClr val="tx1"/>
+          </a:fontRef>
+        </p:style>
+      </p:cxnSp>
+      <p:cxnSp>
+        <p:nvCxnSpPr>
+          <p:cNvPr id="65" name="Shape 64"/>
+          <p:cNvCxnSpPr>
+            <a:stCxn id="50" idx="1"/>
+          </p:cNvCxnSpPr>
+          <p:nvPr/>
+        </p:nvCxnSpPr>
+        <p:spPr>
+          <a:xfrm rot="10800000">
+            <a:off x="3089566" y="4454483"/>
+            <a:ext cx="604319" cy="511387"/>
+          </a:xfrm>
+          <a:prstGeom prst="bentConnector2">
+            <a:avLst/>
+          </a:prstGeom>
+          <a:ln>
+            <a:solidFill>
+              <a:schemeClr val="tx1"/>
+            </a:solidFill>
+            <a:tailEnd type="arrow"/>
+          </a:ln>
+        </p:spPr>
+        <p:style>
+          <a:lnRef idx="2">
+            <a:schemeClr val="accent1"/>
+          </a:lnRef>
+          <a:fillRef idx="0">
+            <a:schemeClr val="accent1"/>
+          </a:fillRef>
+          <a:effectRef idx="1">
+            <a:schemeClr val="accent1"/>
+          </a:effectRef>
+          <a:fontRef idx="minor">
+            <a:schemeClr val="tx1"/>
+          </a:fontRef>
+        </p:style>
+      </p:cxnSp>
+      <p:sp>
+        <p:nvSpPr>
+          <p:cNvPr id="70" name="TextBox 69"/>
+          <p:cNvSpPr txBox="1"/>
+          <p:nvPr/>
+        </p:nvSpPr>
+        <p:spPr>
+          <a:xfrm>
+            <a:off x="7962902" y="3594473"/>
+            <a:ext cx="395235" cy="307777"/>
+          </a:xfrm>
+          <a:prstGeom prst="rect">
+            <a:avLst/>
+          </a:prstGeom>
+          <a:noFill/>
+        </p:spPr>
+        <p:txBody>
+          <a:bodyPr wrap="none" rtlCol="0">
+            <a:spAutoFit/>
+          </a:bodyPr>
+          <a:lstStyle/>
+          <a:p>
+            <a:r>
+              <a:rPr lang="en-US" sz="1400" dirty="0" smtClean="0"/>
+              <a:t>No</a:t>
+            </a:r>
+            <a:endParaRPr lang="en-US" sz="1400" dirty="0"/>
+          </a:p>
+        </p:txBody>
+      </p:sp>
+      <p:sp>
+        <p:nvSpPr>
+          <p:cNvPr id="71" name="TextBox 70"/>
+          <p:cNvSpPr txBox="1"/>
+          <p:nvPr/>
+        </p:nvSpPr>
+        <p:spPr>
+          <a:xfrm>
+            <a:off x="7975602" y="4551206"/>
+            <a:ext cx="418817" cy="307777"/>
+          </a:xfrm>
+          <a:prstGeom prst="rect">
+            <a:avLst/>
+          </a:prstGeom>
+          <a:noFill/>
+        </p:spPr>
+        <p:txBody>
+          <a:bodyPr wrap="none" rtlCol="0">
+            <a:spAutoFit/>
+          </a:bodyPr>
+          <a:lstStyle/>
+          <a:p>
+            <a:r>
+              <a:rPr lang="en-US" sz="1400" dirty="0" smtClean="0"/>
+              <a:t>Yes</a:t>
+            </a:r>
+            <a:endParaRPr lang="en-US" sz="1400" dirty="0"/>
+          </a:p>
+        </p:txBody>
+      </p:sp>
       <p:grpSp>
         <p:nvGrpSpPr>
-          <p:cNvPr id="72" name="Group 71"/>
+          <p:cNvPr id="96" name="Group 95"/>
           <p:cNvGrpSpPr/>
           <p:nvPr/>
         </p:nvGrpSpPr>
         <p:grpSpPr>
           <a:xfrm>
-            <a:off x="1075266" y="3282696"/>
-            <a:ext cx="7442201" cy="1903306"/>
-            <a:chOff x="1075266" y="3282696"/>
-            <a:chExt cx="7442201" cy="1903306"/>
+            <a:off x="990597" y="850392"/>
+            <a:ext cx="4212339" cy="1816609"/>
+            <a:chOff x="990597" y="850392"/>
+            <a:chExt cx="4212339" cy="1816609"/>
           </a:xfrm>
         </p:grpSpPr>
-        <p:cxnSp>
-          <p:nvCxnSpPr>
-            <p:cNvPr id="8" name="Straight Connector 7"/>
-            <p:cNvCxnSpPr>
-              <a:stCxn id="24" idx="3"/>
-              <a:endCxn id="22" idx="1"/>
-            </p:cNvCxnSpPr>
-            <p:nvPr/>
-          </p:nvCxnSpPr>
-          <p:spPr>
-            <a:xfrm>
-              <a:off x="1956117" y="4234349"/>
-              <a:ext cx="423608" cy="1588"/>
-            </a:xfrm>
-            <a:prstGeom prst="line">
-              <a:avLst/>
-            </a:prstGeom>
-            <a:ln w="25400">
-              <a:solidFill>
-                <a:schemeClr val="tx1"/>
-              </a:solidFill>
-              <a:tailEnd type="triangle"/>
-            </a:ln>
-          </p:spPr>
-          <p:style>
-            <a:lnRef idx="2">
-              <a:schemeClr val="accent1"/>
-            </a:lnRef>
-            <a:fillRef idx="0">
-              <a:schemeClr val="accent1"/>
-            </a:fillRef>
-            <a:effectRef idx="1">
-              <a:schemeClr val="accent1"/>
-            </a:effectRef>
-            <a:fontRef idx="minor">
-              <a:schemeClr val="tx1"/>
-            </a:fontRef>
-          </p:style>
-        </p:cxnSp>
         <p:sp>
           <p:nvSpPr>
-            <p:cNvPr id="22" name="Rectangle 21"/>
+            <p:cNvPr id="19" name="Rectangle 18"/>
             <p:cNvSpPr/>
             <p:nvPr/>
           </p:nvSpPr>
           <p:spPr>
             <a:xfrm>
-              <a:off x="2379725" y="4014216"/>
-              <a:ext cx="877824" cy="440266"/>
+              <a:off x="990597" y="915754"/>
+              <a:ext cx="889317" cy="407191"/>
             </a:xfrm>
             <a:prstGeom prst="rect">
               <a:avLst/>
             </a:prstGeom>
             <a:noFill/>
             <a:ln>
-              <a:solidFill>
-                <a:schemeClr val="tx1"/>
-              </a:solidFill>
+              <a:noFill/>
             </a:ln>
             <a:effectLst/>
           </p:spPr>
@@ -5238,14 +6134,14 @@
             <a:p>
               <a:pPr algn="ctr"/>
               <a:r>
-                <a:rPr lang="en-US" sz="1400" dirty="0" smtClean="0">
+                <a:rPr lang="en-US" sz="900" dirty="0" smtClean="0">
                   <a:solidFill>
                     <a:schemeClr val="tx1"/>
                   </a:solidFill>
                 </a:rPr>
-                <a:t>Execution</a:t>
+                <a:t>Snapshot</a:t>
               </a:r>
-              <a:endParaRPr lang="en-US" sz="1400" dirty="0">
+              <a:endParaRPr lang="en-US" sz="900" dirty="0">
                 <a:solidFill>
                   <a:schemeClr val="tx1"/>
                 </a:solidFill>
@@ -5253,25 +6149,88 @@
             </a:p>
           </p:txBody>
         </p:sp>
+        <p:cxnSp>
+          <p:nvCxnSpPr>
+            <p:cNvPr id="21" name="Straight Connector 20"/>
+            <p:cNvCxnSpPr/>
+            <p:nvPr/>
+          </p:nvCxnSpPr>
+          <p:spPr>
+            <a:xfrm rot="5400000">
+              <a:off x="1253622" y="1392370"/>
+              <a:ext cx="363274" cy="1590"/>
+            </a:xfrm>
+            <a:prstGeom prst="line">
+              <a:avLst/>
+            </a:prstGeom>
+            <a:effectLst/>
+          </p:spPr>
+          <p:style>
+            <a:lnRef idx="2">
+              <a:schemeClr val="accent1"/>
+            </a:lnRef>
+            <a:fillRef idx="0">
+              <a:schemeClr val="accent1"/>
+            </a:fillRef>
+            <a:effectRef idx="1">
+              <a:schemeClr val="accent1"/>
+            </a:effectRef>
+            <a:fontRef idx="minor">
+              <a:schemeClr val="tx1"/>
+            </a:fontRef>
+          </p:style>
+        </p:cxnSp>
+        <p:cxnSp>
+          <p:nvCxnSpPr>
+            <p:cNvPr id="27" name="Straight Connector 26"/>
+            <p:cNvCxnSpPr/>
+            <p:nvPr/>
+          </p:nvCxnSpPr>
+          <p:spPr>
+            <a:xfrm>
+              <a:off x="1436053" y="1406254"/>
+              <a:ext cx="2020802" cy="1588"/>
+            </a:xfrm>
+            <a:prstGeom prst="line">
+              <a:avLst/>
+            </a:prstGeom>
+            <a:ln>
+              <a:tailEnd type="triangle"/>
+            </a:ln>
+            <a:effectLst/>
+          </p:spPr>
+          <p:style>
+            <a:lnRef idx="2">
+              <a:schemeClr val="accent1"/>
+            </a:lnRef>
+            <a:fillRef idx="0">
+              <a:schemeClr val="accent1"/>
+            </a:fillRef>
+            <a:effectRef idx="1">
+              <a:schemeClr val="accent1"/>
+            </a:effectRef>
+            <a:fontRef idx="minor">
+              <a:schemeClr val="tx1"/>
+            </a:fontRef>
+          </p:style>
+        </p:cxnSp>
         <p:sp>
           <p:nvSpPr>
-            <p:cNvPr id="24" name="Rectangle 23"/>
+            <p:cNvPr id="29" name="Rectangle 28"/>
             <p:cNvSpPr/>
             <p:nvPr/>
           </p:nvSpPr>
           <p:spPr>
             <a:xfrm>
-              <a:off x="1075266" y="4014216"/>
-              <a:ext cx="880851" cy="440266"/>
+              <a:off x="1435263" y="1209046"/>
+              <a:ext cx="2021592" cy="198796"/>
             </a:xfrm>
             <a:prstGeom prst="rect">
               <a:avLst/>
             </a:prstGeom>
             <a:noFill/>
             <a:ln>
-              <a:solidFill>
-                <a:schemeClr val="tx1"/>
-              </a:solidFill>
+              <a:noFill/>
             </a:ln>
             <a:effectLst/>
           </p:spPr>
@@ -5295,14 +6254,14 @@
             <a:p>
               <a:pPr algn="ctr"/>
               <a:r>
-                <a:rPr lang="en-US" sz="1400" dirty="0" smtClean="0">
+                <a:rPr lang="en-US" sz="900" dirty="0" smtClean="0">
                   <a:solidFill>
                     <a:schemeClr val="tx1"/>
                   </a:solidFill>
                 </a:rPr>
-                <a:t>Snapshot Execution</a:t>
+                <a:t>Normal execution</a:t>
               </a:r>
-              <a:endParaRPr lang="en-US" sz="1400" dirty="0">
+              <a:endParaRPr lang="en-US" sz="900" dirty="0">
                 <a:solidFill>
                   <a:schemeClr val="tx1"/>
                 </a:solidFill>
@@ -5310,25 +6269,54 @@
             </a:p>
           </p:txBody>
         </p:sp>
+        <p:cxnSp>
+          <p:nvCxnSpPr>
+            <p:cNvPr id="32" name="Straight Connector 31"/>
+            <p:cNvCxnSpPr/>
+            <p:nvPr/>
+          </p:nvCxnSpPr>
+          <p:spPr>
+            <a:xfrm rot="5400000">
+              <a:off x="3277229" y="1389888"/>
+              <a:ext cx="363274" cy="1590"/>
+            </a:xfrm>
+            <a:prstGeom prst="line">
+              <a:avLst/>
+            </a:prstGeom>
+            <a:effectLst/>
+          </p:spPr>
+          <p:style>
+            <a:lnRef idx="2">
+              <a:schemeClr val="accent1"/>
+            </a:lnRef>
+            <a:fillRef idx="0">
+              <a:schemeClr val="accent1"/>
+            </a:fillRef>
+            <a:effectRef idx="1">
+              <a:schemeClr val="accent1"/>
+            </a:effectRef>
+            <a:fontRef idx="minor">
+              <a:schemeClr val="tx1"/>
+            </a:fontRef>
+          </p:style>
+        </p:cxnSp>
         <p:sp>
           <p:nvSpPr>
-            <p:cNvPr id="26" name="Rectangle 25"/>
+            <p:cNvPr id="33" name="Rectangle 32"/>
             <p:cNvSpPr/>
             <p:nvPr/>
           </p:nvSpPr>
           <p:spPr>
             <a:xfrm>
-              <a:off x="3693884" y="4014216"/>
-              <a:ext cx="2052574" cy="440266"/>
+              <a:off x="3013362" y="850392"/>
+              <a:ext cx="889317" cy="407191"/>
             </a:xfrm>
             <a:prstGeom prst="rect">
               <a:avLst/>
             </a:prstGeom>
             <a:noFill/>
             <a:ln>
-              <a:solidFill>
-                <a:schemeClr val="tx1"/>
-              </a:solidFill>
+              <a:noFill/>
             </a:ln>
             <a:effectLst/>
           </p:spPr>
@@ -5352,49 +6340,25 @@
             <a:p>
               <a:pPr algn="ctr"/>
               <a:r>
-                <a:rPr lang="en-US" sz="1400" dirty="0" smtClean="0">
+                <a:rPr lang="en-US" sz="900" dirty="0" smtClean="0">
                   <a:solidFill>
                     <a:schemeClr val="tx1"/>
                   </a:solidFill>
                 </a:rPr>
-                <a:t>Stop Execution before</a:t>
+                <a:t>Irrevocable  </a:t>
               </a:r>
             </a:p>
             <a:p>
               <a:pPr algn="ctr"/>
               <a:r>
-                <a:rPr lang="en-US" sz="1400" dirty="0" smtClean="0">
+                <a:rPr lang="en-US" sz="900" dirty="0" smtClean="0">
                   <a:solidFill>
                     <a:schemeClr val="tx1"/>
                   </a:solidFill>
                 </a:rPr>
-                <a:t>Non-</a:t>
+                <a:t>system calls</a:t>
               </a:r>
-              <a:r>
-                <a:rPr lang="en-US" sz="1400" dirty="0" err="1" smtClean="0">
-                  <a:solidFill>
-                    <a:schemeClr val="tx1"/>
-                  </a:solidFill>
-                </a:rPr>
-                <a:t>rollbackable</a:t>
-              </a:r>
-              <a:r>
-                <a:rPr lang="en-US" sz="1400" dirty="0" smtClean="0">
-                  <a:solidFill>
-                    <a:schemeClr val="tx1"/>
-                  </a:solidFill>
-                </a:rPr>
-                <a:t> </a:t>
-              </a:r>
-              <a:r>
-                <a:rPr lang="en-US" sz="1400" dirty="0" err="1" smtClean="0">
-                  <a:solidFill>
-                    <a:schemeClr val="tx1"/>
-                  </a:solidFill>
-                </a:rPr>
-                <a:t>Syscalls</a:t>
-              </a:r>
-              <a:endParaRPr lang="en-US" sz="1400" dirty="0">
+              <a:endParaRPr lang="en-US" sz="900" dirty="0">
                 <a:solidFill>
                   <a:schemeClr val="tx1"/>
                 </a:solidFill>
@@ -5404,27 +6368,56 @@
         </p:sp>
         <p:cxnSp>
           <p:nvCxnSpPr>
-            <p:cNvPr id="28" name="Straight Connector 27"/>
-            <p:cNvCxnSpPr>
-              <a:stCxn id="22" idx="3"/>
-              <a:endCxn id="26" idx="1"/>
-            </p:cNvCxnSpPr>
+            <p:cNvPr id="36" name="Straight Connector 35"/>
+            <p:cNvCxnSpPr/>
+            <p:nvPr/>
+          </p:nvCxnSpPr>
+          <p:spPr>
+            <a:xfrm flipV="1">
+              <a:off x="3459661" y="1403078"/>
+              <a:ext cx="807539" cy="1588"/>
+            </a:xfrm>
+            <a:prstGeom prst="line">
+              <a:avLst/>
+            </a:prstGeom>
+            <a:ln>
+              <a:prstDash val="sysDash"/>
+            </a:ln>
+            <a:effectLst/>
+          </p:spPr>
+          <p:style>
+            <a:lnRef idx="2">
+              <a:schemeClr val="accent1"/>
+            </a:lnRef>
+            <a:fillRef idx="0">
+              <a:schemeClr val="accent1"/>
+            </a:fillRef>
+            <a:effectRef idx="1">
+              <a:schemeClr val="accent1"/>
+            </a:effectRef>
+            <a:fontRef idx="minor">
+              <a:schemeClr val="tx1"/>
+            </a:fontRef>
+          </p:style>
+        </p:cxnSp>
+        <p:cxnSp>
+          <p:nvCxnSpPr>
+            <p:cNvPr id="40" name="Straight Connector 39"/>
+            <p:cNvCxnSpPr/>
             <p:nvPr/>
           </p:nvCxnSpPr>
           <p:spPr>
             <a:xfrm>
-              <a:off x="3257549" y="4234349"/>
-              <a:ext cx="436335" cy="1588"/>
+              <a:off x="4278844" y="1403078"/>
+              <a:ext cx="924092" cy="1588"/>
             </a:xfrm>
             <a:prstGeom prst="line">
               <a:avLst/>
             </a:prstGeom>
-            <a:ln w="25400">
-              <a:solidFill>
-                <a:schemeClr val="tx1"/>
-              </a:solidFill>
+            <a:ln>
               <a:tailEnd type="triangle"/>
             </a:ln>
+            <a:effectLst/>
           </p:spPr>
           <p:style>
             <a:lnRef idx="2">
@@ -5443,23 +6436,21 @@
         </p:cxnSp>
         <p:sp>
           <p:nvSpPr>
-            <p:cNvPr id="34" name="Rectangle 33"/>
+            <p:cNvPr id="45" name="Rectangle 44"/>
             <p:cNvSpPr/>
             <p:nvPr/>
           </p:nvSpPr>
           <p:spPr>
             <a:xfrm>
-              <a:off x="6173047" y="4014216"/>
-              <a:ext cx="877824" cy="440266"/>
+              <a:off x="3826476" y="914400"/>
+              <a:ext cx="889317" cy="407191"/>
             </a:xfrm>
             <a:prstGeom prst="rect">
               <a:avLst/>
             </a:prstGeom>
             <a:noFill/>
             <a:ln>
-              <a:solidFill>
-                <a:schemeClr val="tx1"/>
-              </a:solidFill>
+              <a:noFill/>
             </a:ln>
             <a:effectLst/>
           </p:spPr>
@@ -5483,14 +6474,14 @@
             <a:p>
               <a:pPr algn="ctr"/>
               <a:r>
-                <a:rPr lang="en-US" sz="1400" dirty="0" smtClean="0">
+                <a:rPr lang="en-US" sz="900" dirty="0" smtClean="0">
                   <a:solidFill>
                     <a:schemeClr val="tx1"/>
                   </a:solidFill>
                 </a:rPr>
-                <a:t>Check Overflows</a:t>
+                <a:t>Snapshot</a:t>
               </a:r>
-              <a:endParaRPr lang="en-US" sz="1400" dirty="0">
+              <a:endParaRPr lang="en-US" sz="900" dirty="0">
                 <a:solidFill>
                   <a:schemeClr val="tx1"/>
                 </a:solidFill>
@@ -5500,27 +6491,53 @@
         </p:sp>
         <p:cxnSp>
           <p:nvCxnSpPr>
-            <p:cNvPr id="35" name="Straight Connector 34"/>
-            <p:cNvCxnSpPr>
-              <a:stCxn id="26" idx="3"/>
-              <a:endCxn id="34" idx="1"/>
-            </p:cNvCxnSpPr>
+            <p:cNvPr id="46" name="Straight Connector 45"/>
+            <p:cNvCxnSpPr/>
             <p:nvPr/>
           </p:nvCxnSpPr>
           <p:spPr>
-            <a:xfrm>
-              <a:off x="5746458" y="4234349"/>
-              <a:ext cx="426589" cy="1588"/>
+            <a:xfrm rot="5400000">
+              <a:off x="4081034" y="1389888"/>
+              <a:ext cx="363274" cy="1590"/>
             </a:xfrm>
             <a:prstGeom prst="line">
               <a:avLst/>
             </a:prstGeom>
-            <a:ln w="25400">
-              <a:solidFill>
-                <a:schemeClr val="tx1"/>
-              </a:solidFill>
+            <a:effectLst/>
+          </p:spPr>
+          <p:style>
+            <a:lnRef idx="2">
+              <a:schemeClr val="accent1"/>
+            </a:lnRef>
+            <a:fillRef idx="0">
+              <a:schemeClr val="accent1"/>
+            </a:fillRef>
+            <a:effectRef idx="1">
+              <a:schemeClr val="accent1"/>
+            </a:effectRef>
+            <a:fontRef idx="minor">
+              <a:schemeClr val="tx1"/>
+            </a:fontRef>
+          </p:style>
+        </p:cxnSp>
+        <p:cxnSp>
+          <p:nvCxnSpPr>
+            <p:cNvPr id="49" name="Straight Connector 48"/>
+            <p:cNvCxnSpPr/>
+            <p:nvPr/>
+          </p:nvCxnSpPr>
+          <p:spPr>
+            <a:xfrm rot="5400000">
+              <a:off x="3751803" y="1557130"/>
+              <a:ext cx="301752" cy="1588"/>
+            </a:xfrm>
+            <a:prstGeom prst="line">
+              <a:avLst/>
+            </a:prstGeom>
+            <a:ln>
               <a:tailEnd type="triangle"/>
             </a:ln>
+            <a:effectLst/>
           </p:spPr>
           <p:style>
             <a:lnRef idx="2">
@@ -5539,24 +6556,21 @@
         </p:cxnSp>
         <p:sp>
           <p:nvSpPr>
-            <p:cNvPr id="38" name="Hexagon 37"/>
+            <p:cNvPr id="54" name="Rectangle 53"/>
             <p:cNvSpPr/>
             <p:nvPr/>
           </p:nvSpPr>
           <p:spPr>
             <a:xfrm>
-              <a:off x="7476066" y="4052569"/>
-              <a:ext cx="1041401" cy="370524"/>
+              <a:off x="3448389" y="1719527"/>
+              <a:ext cx="898192" cy="202399"/>
             </a:xfrm>
-            <a:prstGeom prst="hexagon">
+            <a:prstGeom prst="rect">
               <a:avLst/>
             </a:prstGeom>
-            <a:noFill/>
-            <a:ln>
-              <a:solidFill>
-                <a:schemeClr val="tx1"/>
-              </a:solidFill>
-            </a:ln>
+            <a:solidFill>
+              <a:schemeClr val="bg1"/>
+            </a:solidFill>
             <a:effectLst/>
           </p:spPr>
           <p:style>
@@ -5574,19 +6588,19 @@
             </a:fontRef>
           </p:style>
           <p:txBody>
-            <a:bodyPr lIns="0" rIns="0" rtlCol="0" anchor="ctr"/>
+            <a:bodyPr tIns="36576" rtlCol="0" anchor="ctr"/>
             <a:lstStyle/>
             <a:p>
               <a:pPr algn="ctr"/>
               <a:r>
-                <a:rPr lang="en-US" sz="1400" dirty="0" smtClean="0">
+                <a:rPr lang="en-US" sz="900" dirty="0" smtClean="0">
                   <a:solidFill>
                     <a:schemeClr val="tx1"/>
                   </a:solidFill>
                 </a:rPr>
-                <a:t>Overflow?</a:t>
+                <a:t>Error detected</a:t>
               </a:r>
-              <a:endParaRPr lang="en-US" sz="1400" dirty="0">
+              <a:endParaRPr lang="en-US" sz="900" dirty="0">
                 <a:solidFill>
                   <a:schemeClr val="tx1"/>
                 </a:solidFill>
@@ -5596,24 +6610,56 @@
         </p:sp>
         <p:cxnSp>
           <p:nvCxnSpPr>
-            <p:cNvPr id="39" name="Straight Connector 38"/>
+            <p:cNvPr id="77" name="Straight Connector 76"/>
+            <p:cNvCxnSpPr/>
+            <p:nvPr/>
+          </p:nvCxnSpPr>
+          <p:spPr>
+            <a:xfrm rot="5400000">
+              <a:off x="946426" y="2059634"/>
+              <a:ext cx="973277" cy="4394"/>
+            </a:xfrm>
+            <a:prstGeom prst="line">
+              <a:avLst/>
+            </a:prstGeom>
+            <a:ln>
+              <a:prstDash val="sysDash"/>
+            </a:ln>
+            <a:effectLst/>
+          </p:spPr>
+          <p:style>
+            <a:lnRef idx="2">
+              <a:schemeClr val="accent1"/>
+            </a:lnRef>
+            <a:fillRef idx="0">
+              <a:schemeClr val="accent1"/>
+            </a:fillRef>
+            <a:effectRef idx="1">
+              <a:schemeClr val="accent1"/>
+            </a:effectRef>
+            <a:fontRef idx="minor">
+              <a:schemeClr val="tx1"/>
+            </a:fontRef>
+          </p:style>
+        </p:cxnSp>
+        <p:cxnSp>
+          <p:nvCxnSpPr>
+            <p:cNvPr id="79" name="Straight Connector 78"/>
             <p:cNvCxnSpPr/>
             <p:nvPr/>
           </p:nvCxnSpPr>
           <p:spPr>
             <a:xfrm>
-              <a:off x="7050871" y="4233067"/>
-              <a:ext cx="426589" cy="4764"/>
+              <a:off x="1436047" y="2210613"/>
+              <a:ext cx="2020802" cy="1588"/>
             </a:xfrm>
             <a:prstGeom prst="line">
               <a:avLst/>
             </a:prstGeom>
-            <a:ln w="25400">
-              <a:solidFill>
-                <a:schemeClr val="tx1"/>
-              </a:solidFill>
+            <a:ln>
               <a:tailEnd type="triangle"/>
             </a:ln>
+            <a:effectLst/>
           </p:spPr>
           <p:style>
             <a:lnRef idx="2">
@@ -5632,23 +6678,117 @@
         </p:cxnSp>
         <p:sp>
           <p:nvSpPr>
-            <p:cNvPr id="42" name="Rectangle 41"/>
+            <p:cNvPr id="88" name="Freeform 87"/>
             <p:cNvSpPr/>
             <p:nvPr/>
           </p:nvSpPr>
           <p:spPr>
             <a:xfrm>
-              <a:off x="3721100" y="3282696"/>
-              <a:ext cx="1898358" cy="440266"/>
+              <a:off x="1430867" y="1820333"/>
+              <a:ext cx="2015066" cy="381000"/>
+            </a:xfrm>
+            <a:custGeom>
+              <a:avLst/>
+              <a:gdLst>
+                <a:gd name="connsiteX0" fmla="*/ 2015066 w 2015066"/>
+                <a:gd name="connsiteY0" fmla="*/ 0 h 381000"/>
+                <a:gd name="connsiteX1" fmla="*/ 914400 w 2015066"/>
+                <a:gd name="connsiteY1" fmla="*/ 110067 h 381000"/>
+                <a:gd name="connsiteX2" fmla="*/ 0 w 2015066"/>
+                <a:gd name="connsiteY2" fmla="*/ 381000 h 381000"/>
+                <a:gd name="connsiteX3" fmla="*/ 0 w 2015066"/>
+                <a:gd name="connsiteY3" fmla="*/ 381000 h 381000"/>
+                <a:gd name="connsiteX4" fmla="*/ 0 w 2015066"/>
+                <a:gd name="connsiteY4" fmla="*/ 381000 h 381000"/>
+              </a:gdLst>
+              <a:ahLst/>
+              <a:cxnLst>
+                <a:cxn ang="0">
+                  <a:pos x="connsiteX0" y="connsiteY0"/>
+                </a:cxn>
+                <a:cxn ang="0">
+                  <a:pos x="connsiteX1" y="connsiteY1"/>
+                </a:cxn>
+                <a:cxn ang="0">
+                  <a:pos x="connsiteX2" y="connsiteY2"/>
+                </a:cxn>
+                <a:cxn ang="0">
+                  <a:pos x="connsiteX3" y="connsiteY3"/>
+                </a:cxn>
+                <a:cxn ang="0">
+                  <a:pos x="connsiteX4" y="connsiteY4"/>
+                </a:cxn>
+              </a:cxnLst>
+              <a:rect l="l" t="t" r="r" b="b"/>
+              <a:pathLst>
+                <a:path w="2015066" h="381000">
+                  <a:moveTo>
+                    <a:pt x="2015066" y="0"/>
+                  </a:moveTo>
+                  <a:cubicBezTo>
+                    <a:pt x="1632655" y="23283"/>
+                    <a:pt x="1250244" y="46567"/>
+                    <a:pt x="914400" y="110067"/>
+                  </a:cubicBezTo>
+                  <a:cubicBezTo>
+                    <a:pt x="578556" y="173567"/>
+                    <a:pt x="0" y="381000"/>
+                    <a:pt x="0" y="381000"/>
+                  </a:cubicBezTo>
+                  <a:lnTo>
+                    <a:pt x="0" y="381000"/>
+                  </a:lnTo>
+                  <a:lnTo>
+                    <a:pt x="0" y="381000"/>
+                  </a:lnTo>
+                </a:path>
+              </a:pathLst>
+            </a:custGeom>
+            <a:ln>
+              <a:tailEnd type="triangle"/>
+            </a:ln>
+            <a:effectLst/>
+          </p:spPr>
+          <p:style>
+            <a:lnRef idx="2">
+              <a:schemeClr val="accent1"/>
+            </a:lnRef>
+            <a:fillRef idx="0">
+              <a:schemeClr val="accent1"/>
+            </a:fillRef>
+            <a:effectRef idx="1">
+              <a:schemeClr val="accent1"/>
+            </a:effectRef>
+            <a:fontRef idx="minor">
+              <a:schemeClr val="tx1"/>
+            </a:fontRef>
+          </p:style>
+          <p:txBody>
+            <a:bodyPr rtlCol="0" anchor="ctr"/>
+            <a:lstStyle/>
+            <a:p>
+              <a:pPr algn="ctr"/>
+              <a:endParaRPr lang="en-US"/>
+            </a:p>
+          </p:txBody>
+        </p:sp>
+        <p:sp>
+          <p:nvSpPr>
+            <p:cNvPr id="90" name="Rectangle 89"/>
+            <p:cNvSpPr/>
+            <p:nvPr/>
+          </p:nvSpPr>
+          <p:spPr>
+            <a:xfrm>
+              <a:off x="1964584" y="1744928"/>
+              <a:ext cx="736871" cy="187862"/>
             </a:xfrm>
             <a:prstGeom prst="rect">
               <a:avLst/>
             </a:prstGeom>
             <a:noFill/>
             <a:ln>
-              <a:solidFill>
-                <a:schemeClr val="tx1"/>
-              </a:solidFill>
+              <a:noFill/>
             </a:ln>
             <a:effectLst/>
           </p:spPr>
@@ -5672,49 +6812,14 @@
             <a:p>
               <a:pPr algn="ctr"/>
               <a:r>
-                <a:rPr lang="en-US" sz="1400" dirty="0" smtClean="0">
+                <a:rPr lang="en-US" sz="900" dirty="0" smtClean="0">
                   <a:solidFill>
                     <a:schemeClr val="tx1"/>
                   </a:solidFill>
                 </a:rPr>
-                <a:t>Perform this </a:t>
+                <a:t>Rollback</a:t>
               </a:r>
-            </a:p>
-            <a:p>
-              <a:pPr algn="ctr"/>
-              <a:r>
-                <a:rPr lang="en-US" sz="1400" dirty="0" smtClean="0">
-                  <a:solidFill>
-                    <a:schemeClr val="tx1"/>
-                  </a:solidFill>
-                </a:rPr>
-                <a:t>Non-</a:t>
-              </a:r>
-              <a:r>
-                <a:rPr lang="en-US" sz="1400" dirty="0" err="1" smtClean="0">
-                  <a:solidFill>
-                    <a:schemeClr val="tx1"/>
-                  </a:solidFill>
-                </a:rPr>
-                <a:t>rollbackable</a:t>
-              </a:r>
-              <a:r>
-                <a:rPr lang="en-US" sz="1400" dirty="0" smtClean="0">
-                  <a:solidFill>
-                    <a:schemeClr val="tx1"/>
-                  </a:solidFill>
-                </a:rPr>
-                <a:t> </a:t>
-              </a:r>
-              <a:r>
-                <a:rPr lang="en-US" sz="1400" dirty="0" err="1" smtClean="0">
-                  <a:solidFill>
-                    <a:schemeClr val="tx1"/>
-                  </a:solidFill>
-                </a:rPr>
-                <a:t>Syscall</a:t>
-              </a:r>
-              <a:endParaRPr lang="en-US" sz="1400" dirty="0">
+              <a:endParaRPr lang="en-US" sz="900" dirty="0">
                 <a:solidFill>
                   <a:schemeClr val="tx1"/>
                 </a:solidFill>
@@ -5722,104 +6827,23 @@
             </a:p>
           </p:txBody>
         </p:sp>
-        <p:cxnSp>
-          <p:nvCxnSpPr>
-            <p:cNvPr id="44" name="Elbow Connector 43"/>
-            <p:cNvCxnSpPr>
-              <a:endCxn id="42" idx="3"/>
-            </p:cNvCxnSpPr>
-            <p:nvPr/>
-          </p:nvCxnSpPr>
-          <p:spPr>
-            <a:xfrm rot="10800000">
-              <a:off x="5619459" y="3502829"/>
-              <a:ext cx="2381543" cy="549740"/>
-            </a:xfrm>
-            <a:prstGeom prst="bentConnector3">
-              <a:avLst>
-                <a:gd name="adj1" fmla="val -127"/>
-              </a:avLst>
-            </a:prstGeom>
-            <a:ln>
-              <a:solidFill>
-                <a:schemeClr val="tx1"/>
-              </a:solidFill>
-              <a:tailEnd type="arrow"/>
-            </a:ln>
-          </p:spPr>
-          <p:style>
-            <a:lnRef idx="2">
-              <a:schemeClr val="accent1"/>
-            </a:lnRef>
-            <a:fillRef idx="0">
-              <a:schemeClr val="accent1"/>
-            </a:fillRef>
-            <a:effectRef idx="1">
-              <a:schemeClr val="accent1"/>
-            </a:effectRef>
-            <a:fontRef idx="minor">
-              <a:schemeClr val="tx1"/>
-            </a:fontRef>
-          </p:style>
-        </p:cxnSp>
-        <p:cxnSp>
-          <p:nvCxnSpPr>
-            <p:cNvPr id="47" name="Elbow Connector 46"/>
-            <p:cNvCxnSpPr>
-              <a:stCxn id="42" idx="1"/>
-              <a:endCxn id="24" idx="0"/>
-            </p:cNvCxnSpPr>
-            <p:nvPr/>
-          </p:nvCxnSpPr>
-          <p:spPr>
-            <a:xfrm rot="10800000" flipV="1">
-              <a:off x="1515692" y="3502828"/>
-              <a:ext cx="2205408" cy="511387"/>
-            </a:xfrm>
-            <a:prstGeom prst="bentConnector2">
-              <a:avLst/>
-            </a:prstGeom>
-            <a:ln>
-              <a:solidFill>
-                <a:schemeClr val="tx1"/>
-              </a:solidFill>
-              <a:tailEnd type="arrow"/>
-            </a:ln>
-          </p:spPr>
-          <p:style>
-            <a:lnRef idx="2">
-              <a:schemeClr val="accent1"/>
-            </a:lnRef>
-            <a:fillRef idx="0">
-              <a:schemeClr val="accent1"/>
-            </a:fillRef>
-            <a:effectRef idx="1">
-              <a:schemeClr val="accent1"/>
-            </a:effectRef>
-            <a:fontRef idx="minor">
-              <a:schemeClr val="tx1"/>
-            </a:fontRef>
-          </p:style>
-        </p:cxnSp>
         <p:sp>
           <p:nvSpPr>
-            <p:cNvPr id="50" name="Rectangle 49"/>
+            <p:cNvPr id="91" name="Rectangle 90"/>
             <p:cNvSpPr/>
             <p:nvPr/>
           </p:nvSpPr>
           <p:spPr>
             <a:xfrm>
-              <a:off x="3693884" y="4745736"/>
-              <a:ext cx="1182915" cy="440266"/>
+              <a:off x="1667937" y="2216607"/>
+              <a:ext cx="1353886" cy="198796"/>
             </a:xfrm>
             <a:prstGeom prst="rect">
               <a:avLst/>
             </a:prstGeom>
             <a:noFill/>
             <a:ln>
-              <a:solidFill>
-                <a:schemeClr val="tx1"/>
-              </a:solidFill>
+              <a:noFill/>
             </a:ln>
             <a:effectLst/>
           </p:spPr>
@@ -5843,27 +6867,66 @@
             <a:p>
               <a:pPr algn="ctr"/>
               <a:r>
-                <a:rPr lang="en-US" sz="1400" dirty="0" smtClean="0">
+                <a:rPr lang="en-US" sz="900" dirty="0" smtClean="0">
                   <a:solidFill>
                     <a:schemeClr val="tx1"/>
                   </a:solidFill>
                 </a:rPr>
-                <a:t>Rollback to</a:t>
+                <a:t>Instrumented re-execution</a:t>
               </a:r>
             </a:p>
+          </p:txBody>
+        </p:sp>
+        <p:sp>
+          <p:nvSpPr>
+            <p:cNvPr id="93" name="Oval Callout 92"/>
+            <p:cNvSpPr/>
+            <p:nvPr/>
+          </p:nvSpPr>
+          <p:spPr>
+            <a:xfrm>
+              <a:off x="2701456" y="2429929"/>
+              <a:ext cx="992430" cy="237072"/>
+            </a:xfrm>
+            <a:prstGeom prst="wedgeEllipseCallout">
+              <a:avLst>
+                <a:gd name="adj1" fmla="val -16762"/>
+                <a:gd name="adj2" fmla="val -125830"/>
+              </a:avLst>
+            </a:prstGeom>
+            <a:noFill/>
+            <a:effectLst/>
+          </p:spPr>
+          <p:style>
+            <a:lnRef idx="1">
+              <a:schemeClr val="accent1"/>
+            </a:lnRef>
+            <a:fillRef idx="3">
+              <a:schemeClr val="accent1"/>
+            </a:fillRef>
+            <a:effectRef idx="2">
+              <a:schemeClr val="accent1"/>
+            </a:effectRef>
+            <a:fontRef idx="minor">
+              <a:schemeClr val="lt1"/>
+            </a:fontRef>
+          </p:style>
+          <p:txBody>
+            <a:bodyPr lIns="0" rIns="0" rtlCol="0" anchor="ctr"/>
+            <a:lstStyle/>
             <a:p>
               <a:pPr algn="ctr"/>
               <a:r>
-                <a:rPr lang="en-US" sz="1400" dirty="0" smtClean="0">
+                <a:rPr lang="en-US" sz="900" dirty="0" smtClean="0">
                   <a:solidFill>
-                    <a:schemeClr val="tx1"/>
+                    <a:srgbClr val="000000"/>
                   </a:solidFill>
                 </a:rPr>
-                <a:t> Last Snapshot</a:t>
+                <a:t>Report errors</a:t>
               </a:r>
-              <a:endParaRPr lang="en-US" sz="1400" dirty="0">
+              <a:endParaRPr lang="en-US" sz="900" dirty="0">
                 <a:solidFill>
-                  <a:schemeClr val="tx1"/>
+                  <a:srgbClr val="000000"/>
                 </a:solidFill>
               </a:endParaRPr>
             </a:p>
@@ -5871,23 +6934,21 @@
         </p:sp>
         <p:sp>
           <p:nvSpPr>
-            <p:cNvPr id="52" name="Rectangle 51"/>
+            <p:cNvPr id="94" name="Rectangle 93"/>
             <p:cNvSpPr/>
             <p:nvPr/>
           </p:nvSpPr>
           <p:spPr>
             <a:xfrm>
-              <a:off x="5648275" y="4745735"/>
-              <a:ext cx="1625985" cy="440266"/>
+              <a:off x="3509673" y="1207008"/>
+              <a:ext cx="715198" cy="201168"/>
             </a:xfrm>
             <a:prstGeom prst="rect">
               <a:avLst/>
             </a:prstGeom>
             <a:noFill/>
             <a:ln>
-              <a:solidFill>
-                <a:schemeClr val="tx1"/>
-              </a:solidFill>
+              <a:noFill/>
             </a:ln>
             <a:effectLst/>
           </p:spPr>
@@ -5911,205 +6972,18 @@
             <a:p>
               <a:pPr algn="ctr"/>
               <a:r>
-                <a:rPr lang="en-US" sz="1400" dirty="0" smtClean="0">
+                <a:rPr lang="en-US" sz="900" dirty="0" smtClean="0">
                   <a:solidFill>
                     <a:schemeClr val="tx1"/>
                   </a:solidFill>
                 </a:rPr>
-                <a:t>Install </a:t>
+                <a:t>Check errors</a:t>
               </a:r>
-              <a:r>
-                <a:rPr lang="en-US" sz="1400" dirty="0" err="1" smtClean="0">
-                  <a:solidFill>
-                    <a:schemeClr val="tx1"/>
-                  </a:solidFill>
-                </a:rPr>
-                <a:t>Watchpoints</a:t>
-              </a:r>
-              <a:endParaRPr lang="en-US" sz="1400" dirty="0">
+              <a:endParaRPr lang="en-US" sz="900" dirty="0">
                 <a:solidFill>
                   <a:schemeClr val="tx1"/>
                 </a:solidFill>
               </a:endParaRPr>
-            </a:p>
-          </p:txBody>
-        </p:sp>
-        <p:cxnSp>
-          <p:nvCxnSpPr>
-            <p:cNvPr id="60" name="Elbow Connector 59"/>
-            <p:cNvCxnSpPr>
-              <a:endCxn id="52" idx="3"/>
-            </p:cNvCxnSpPr>
-            <p:nvPr/>
-          </p:nvCxnSpPr>
-          <p:spPr>
-            <a:xfrm rot="10800000" flipV="1">
-              <a:off x="7274260" y="4423096"/>
-              <a:ext cx="726742" cy="542772"/>
-            </a:xfrm>
-            <a:prstGeom prst="bentConnector3">
-              <a:avLst>
-                <a:gd name="adj1" fmla="val -678"/>
-              </a:avLst>
-            </a:prstGeom>
-            <a:ln>
-              <a:solidFill>
-                <a:schemeClr val="tx1"/>
-              </a:solidFill>
-              <a:tailEnd type="arrow"/>
-            </a:ln>
-          </p:spPr>
-          <p:style>
-            <a:lnRef idx="2">
-              <a:schemeClr val="accent1"/>
-            </a:lnRef>
-            <a:fillRef idx="0">
-              <a:schemeClr val="accent1"/>
-            </a:fillRef>
-            <a:effectRef idx="1">
-              <a:schemeClr val="accent1"/>
-            </a:effectRef>
-            <a:fontRef idx="minor">
-              <a:schemeClr val="tx1"/>
-            </a:fontRef>
-          </p:style>
-        </p:cxnSp>
-        <p:cxnSp>
-          <p:nvCxnSpPr>
-            <p:cNvPr id="63" name="Straight Connector 62"/>
-            <p:cNvCxnSpPr>
-              <a:stCxn id="52" idx="1"/>
-              <a:endCxn id="50" idx="3"/>
-            </p:cNvCxnSpPr>
-            <p:nvPr/>
-          </p:nvCxnSpPr>
-          <p:spPr>
-            <a:xfrm rot="10800000" flipV="1">
-              <a:off x="4876799" y="4965867"/>
-              <a:ext cx="771476" cy="1"/>
-            </a:xfrm>
-            <a:prstGeom prst="line">
-              <a:avLst/>
-            </a:prstGeom>
-            <a:ln>
-              <a:solidFill>
-                <a:schemeClr val="tx1"/>
-              </a:solidFill>
-              <a:headEnd type="none"/>
-              <a:tailEnd type="triangle"/>
-            </a:ln>
-          </p:spPr>
-          <p:style>
-            <a:lnRef idx="2">
-              <a:schemeClr val="accent1"/>
-            </a:lnRef>
-            <a:fillRef idx="0">
-              <a:schemeClr val="accent1"/>
-            </a:fillRef>
-            <a:effectRef idx="1">
-              <a:schemeClr val="accent1"/>
-            </a:effectRef>
-            <a:fontRef idx="minor">
-              <a:schemeClr val="tx1"/>
-            </a:fontRef>
-          </p:style>
-        </p:cxnSp>
-        <p:cxnSp>
-          <p:nvCxnSpPr>
-            <p:cNvPr id="65" name="Shape 64"/>
-            <p:cNvCxnSpPr>
-              <a:stCxn id="50" idx="1"/>
-              <a:endCxn id="22" idx="2"/>
-            </p:cNvCxnSpPr>
-            <p:nvPr/>
-          </p:nvCxnSpPr>
-          <p:spPr>
-            <a:xfrm rot="10800000">
-              <a:off x="2818638" y="4454483"/>
-              <a:ext cx="875247" cy="511387"/>
-            </a:xfrm>
-            <a:prstGeom prst="bentConnector2">
-              <a:avLst/>
-            </a:prstGeom>
-            <a:ln>
-              <a:solidFill>
-                <a:schemeClr val="tx1"/>
-              </a:solidFill>
-              <a:tailEnd type="arrow"/>
-            </a:ln>
-          </p:spPr>
-          <p:style>
-            <a:lnRef idx="2">
-              <a:schemeClr val="accent1"/>
-            </a:lnRef>
-            <a:fillRef idx="0">
-              <a:schemeClr val="accent1"/>
-            </a:fillRef>
-            <a:effectRef idx="1">
-              <a:schemeClr val="accent1"/>
-            </a:effectRef>
-            <a:fontRef idx="minor">
-              <a:schemeClr val="tx1"/>
-            </a:fontRef>
-          </p:style>
-        </p:cxnSp>
-        <p:sp>
-          <p:nvSpPr>
-            <p:cNvPr id="70" name="TextBox 69"/>
-            <p:cNvSpPr txBox="1"/>
-            <p:nvPr/>
-          </p:nvSpPr>
-          <p:spPr>
-            <a:xfrm>
-              <a:off x="7962902" y="3594473"/>
-              <a:ext cx="395235" cy="307777"/>
-            </a:xfrm>
-            <a:prstGeom prst="rect">
-              <a:avLst/>
-            </a:prstGeom>
-            <a:noFill/>
-          </p:spPr>
-          <p:txBody>
-            <a:bodyPr wrap="none" rtlCol="0">
-              <a:spAutoFit/>
-            </a:bodyPr>
-            <a:lstStyle/>
-            <a:p>
-              <a:r>
-                <a:rPr lang="en-US" sz="1400" dirty="0" smtClean="0"/>
-                <a:t>No</a:t>
-              </a:r>
-              <a:endParaRPr lang="en-US" sz="1400" dirty="0"/>
-            </a:p>
-          </p:txBody>
-        </p:sp>
-        <p:sp>
-          <p:nvSpPr>
-            <p:cNvPr id="71" name="TextBox 70"/>
-            <p:cNvSpPr txBox="1"/>
-            <p:nvPr/>
-          </p:nvSpPr>
-          <p:spPr>
-            <a:xfrm>
-              <a:off x="7975602" y="4534273"/>
-              <a:ext cx="418817" cy="307777"/>
-            </a:xfrm>
-            <a:prstGeom prst="rect">
-              <a:avLst/>
-            </a:prstGeom>
-            <a:noFill/>
-          </p:spPr>
-          <p:txBody>
-            <a:bodyPr wrap="none" rtlCol="0">
-              <a:spAutoFit/>
-            </a:bodyPr>
-            <a:lstStyle/>
-            <a:p>
-              <a:r>
-                <a:rPr lang="en-US" sz="1400" dirty="0" smtClean="0"/>
-                <a:t>Yes</a:t>
-              </a:r>
-              <a:endParaRPr lang="en-US" sz="1400" dirty="0"/>
             </a:p>
           </p:txBody>
         </p:sp>
@@ -6119,6 +6993,13 @@
   <p:clrMapOvr>
     <a:masterClrMapping/>
   </p:clrMapOvr>
+  <p:timing>
+    <p:tnLst>
+      <p:par>
+        <p:cTn id="1" dur="indefinite" restart="never" nodeType="tmRoot"/>
+      </p:par>
+    </p:tnLst>
+  </p:timing>
 </p:sld>
 </file>
 
@@ -6141,13 +7022,13 @@
       </p:grpSpPr>
       <p:graphicFrame>
         <p:nvGraphicFramePr>
-          <p:cNvPr id="4" name="Chart 3"/>
+          <p:cNvPr id="3" name="Chart 2"/>
           <p:cNvGraphicFramePr/>
           <p:nvPr/>
         </p:nvGraphicFramePr>
         <p:xfrm>
-          <a:off x="190500" y="1100667"/>
-          <a:ext cx="8763000" cy="3699933"/>
+          <a:off x="190500" y="2074333"/>
+          <a:ext cx="8763000" cy="2743200"/>
         </p:xfrm>
         <a:graphic>
           <a:graphicData uri="http://schemas.openxmlformats.org/drawingml/2006/chart">
@@ -6155,6 +7036,36 @@
           </a:graphicData>
         </a:graphic>
       </p:graphicFrame>
+      <p:sp>
+        <p:nvSpPr>
+          <p:cNvPr id="6" name="TextBox 5"/>
+          <p:cNvSpPr txBox="1"/>
+          <p:nvPr/>
+        </p:nvSpPr>
+        <p:spPr>
+          <a:xfrm>
+            <a:off x="1135212" y="2204731"/>
+            <a:ext cx="464391" cy="200055"/>
+          </a:xfrm>
+          <a:prstGeom prst="rect">
+            <a:avLst/>
+          </a:prstGeom>
+          <a:noFill/>
+        </p:spPr>
+        <p:txBody>
+          <a:bodyPr wrap="square" tIns="0" rtlCol="0">
+            <a:spAutoFit/>
+          </a:bodyPr>
+          <a:lstStyle/>
+          <a:p>
+            <a:r>
+              <a:rPr lang="en-US" sz="1000" dirty="0" smtClean="0"/>
+              <a:t>2.3</a:t>
+            </a:r>
+            <a:endParaRPr lang="en-US" sz="1000" dirty="0"/>
+          </a:p>
+        </p:txBody>
+      </p:sp>
     </p:spTree>
   </p:cSld>
   <p:clrMapOvr>
@@ -6182,7 +7093,7 @@
       </p:grpSpPr>
       <p:graphicFrame>
         <p:nvGraphicFramePr>
-          <p:cNvPr id="4" name="Chart 3"/>
+          <p:cNvPr id="5" name="Chart 4"/>
           <p:cNvGraphicFramePr/>
           <p:nvPr/>
         </p:nvGraphicFramePr>

</xml_diff>